<commit_message>
Expanded git benefits, broke down segments into detail
</commit_message>
<xml_diff>
--- a/Fed Ex Days - Source Code Control presentation.pptx
+++ b/Fed Ex Days - Source Code Control presentation.pptx
@@ -8,11 +8,26 @@
     <p:sldId id="257" r:id="rId2"/>
     <p:sldId id="258" r:id="rId3"/>
     <p:sldId id="259" r:id="rId4"/>
-    <p:sldId id="260" r:id="rId5"/>
+    <p:sldId id="269" r:id="rId5"/>
     <p:sldId id="261" r:id="rId6"/>
-    <p:sldId id="262" r:id="rId7"/>
-    <p:sldId id="263" r:id="rId8"/>
-    <p:sldId id="264" r:id="rId9"/>
+    <p:sldId id="275" r:id="rId7"/>
+    <p:sldId id="276" r:id="rId8"/>
+    <p:sldId id="277" r:id="rId9"/>
+    <p:sldId id="278" r:id="rId10"/>
+    <p:sldId id="265" r:id="rId11"/>
+    <p:sldId id="279" r:id="rId12"/>
+    <p:sldId id="266" r:id="rId13"/>
+    <p:sldId id="268" r:id="rId14"/>
+    <p:sldId id="270" r:id="rId15"/>
+    <p:sldId id="271" r:id="rId16"/>
+    <p:sldId id="272" r:id="rId17"/>
+    <p:sldId id="273" r:id="rId18"/>
+    <p:sldId id="267" r:id="rId19"/>
+    <p:sldId id="263" r:id="rId20"/>
+    <p:sldId id="280" r:id="rId21"/>
+    <p:sldId id="264" r:id="rId22"/>
+    <p:sldId id="281" r:id="rId23"/>
+    <p:sldId id="262" r:id="rId24"/>
   </p:sldIdLst>
   <p:sldSz cx="9144000" cy="6858000" type="screen4x3"/>
   <p:notesSz cx="6858000" cy="9144000"/>
@@ -5117,6 +5132,14 @@
           <a:p>
             <a:r>
               <a:rPr lang="en-US" dirty="0" smtClean="0"/>
+              <a:t>Bryan</a:t>
+            </a:r>
+            <a:r>
+              <a:rPr lang="en-US" dirty="0"/>
+              <a:t>, </a:t>
+            </a:r>
+            <a:r>
+              <a:rPr lang="en-US" dirty="0" smtClean="0"/>
               <a:t>Kevin, </a:t>
             </a:r>
             <a:r>
@@ -5125,13 +5148,25 @@
             </a:r>
             <a:r>
               <a:rPr lang="en-US" dirty="0" smtClean="0"/>
-              <a:t>, Bryan and Scott</a:t>
-            </a:r>
-          </a:p>
-          <a:p>
-            <a:r>
-              <a:rPr lang="en-US" dirty="0" smtClean="0"/>
-              <a:t>May 21, 2014</a:t>
+              <a:t> </a:t>
+            </a:r>
+            <a:r>
+              <a:rPr lang="en-US" dirty="0" smtClean="0"/>
+              <a:t>and Scott</a:t>
+            </a:r>
+          </a:p>
+          <a:p>
+            <a:r>
+              <a:rPr lang="en-US" dirty="0" smtClean="0"/>
+              <a:t>May </a:t>
+            </a:r>
+            <a:r>
+              <a:rPr lang="en-US" dirty="0" smtClean="0"/>
+              <a:t>22, </a:t>
+            </a:r>
+            <a:r>
+              <a:rPr lang="en-US" dirty="0" smtClean="0"/>
+              <a:t>2014</a:t>
             </a:r>
             <a:endParaRPr lang="en-US" dirty="0"/>
           </a:p>
@@ -5141,6 +5176,1538 @@
     <p:extLst>
       <p:ext uri="{BB962C8B-B14F-4D97-AF65-F5344CB8AC3E}">
         <p14:creationId xmlns:p14="http://schemas.microsoft.com/office/powerpoint/2010/main" val="1704546373"/>
+      </p:ext>
+    </p:extLst>
+  </p:cSld>
+  <p:clrMapOvr>
+    <a:masterClrMapping/>
+  </p:clrMapOvr>
+</p:sld>
+</file>
+
+<file path=ppt/slides/slide10.xml><?xml version="1.0" encoding="utf-8"?>
+<p:sld xmlns:a="http://schemas.openxmlformats.org/drawingml/2006/main" xmlns:r="http://schemas.openxmlformats.org/officeDocument/2006/relationships" xmlns:p="http://schemas.openxmlformats.org/presentationml/2006/main">
+  <p:cSld>
+    <p:spTree>
+      <p:nvGrpSpPr>
+        <p:cNvPr id="1" name=""/>
+        <p:cNvGrpSpPr/>
+        <p:nvPr/>
+      </p:nvGrpSpPr>
+      <p:grpSpPr>
+        <a:xfrm>
+          <a:off x="0" y="0"/>
+          <a:ext cx="0" cy="0"/>
+          <a:chOff x="0" y="0"/>
+          <a:chExt cx="0" cy="0"/>
+        </a:xfrm>
+      </p:grpSpPr>
+      <p:sp>
+        <p:nvSpPr>
+          <p:cNvPr id="2" name="Title 1"/>
+          <p:cNvSpPr>
+            <a:spLocks noGrp="1"/>
+          </p:cNvSpPr>
+          <p:nvPr>
+            <p:ph type="title"/>
+          </p:nvPr>
+        </p:nvSpPr>
+        <p:spPr/>
+        <p:txBody>
+          <a:bodyPr/>
+          <a:lstStyle/>
+          <a:p>
+            <a:r>
+              <a:rPr lang="en-US" dirty="0" smtClean="0"/>
+              <a:t>Why </a:t>
+            </a:r>
+            <a:r>
+              <a:rPr lang="en-US" dirty="0" err="1" smtClean="0"/>
+              <a:t>Git</a:t>
+            </a:r>
+            <a:r>
+              <a:rPr lang="en-US" dirty="0" smtClean="0"/>
+              <a:t>?</a:t>
+            </a:r>
+            <a:br>
+              <a:rPr lang="en-US" dirty="0" smtClean="0"/>
+            </a:br>
+            <a:r>
+              <a:rPr lang="en-US" dirty="0" smtClean="0"/>
+              <a:t>Performance</a:t>
+            </a:r>
+            <a:endParaRPr lang="en-US" dirty="0"/>
+          </a:p>
+        </p:txBody>
+      </p:sp>
+      <p:sp>
+        <p:nvSpPr>
+          <p:cNvPr id="3" name="Content Placeholder 2"/>
+          <p:cNvSpPr>
+            <a:spLocks noGrp="1"/>
+          </p:cNvSpPr>
+          <p:nvPr>
+            <p:ph idx="1"/>
+          </p:nvPr>
+        </p:nvSpPr>
+        <p:spPr/>
+        <p:txBody>
+          <a:bodyPr/>
+          <a:lstStyle/>
+          <a:p>
+            <a:r>
+              <a:rPr lang="en-US" dirty="0" smtClean="0"/>
+              <a:t>Almost all operations are local</a:t>
+            </a:r>
+          </a:p>
+        </p:txBody>
+      </p:sp>
+      <p:pic>
+        <p:nvPicPr>
+          <p:cNvPr id="5" name="Picture 4"/>
+          <p:cNvPicPr>
+            <a:picLocks noChangeAspect="1"/>
+          </p:cNvPicPr>
+          <p:nvPr/>
+        </p:nvPicPr>
+        <p:blipFill>
+          <a:blip r:embed="rId2"/>
+          <a:stretch>
+            <a:fillRect/>
+          </a:stretch>
+        </p:blipFill>
+        <p:spPr>
+          <a:xfrm>
+            <a:off x="990218" y="3348739"/>
+            <a:ext cx="7412421" cy="3029328"/>
+          </a:xfrm>
+          <a:prstGeom prst="rect">
+            <a:avLst/>
+          </a:prstGeom>
+        </p:spPr>
+      </p:pic>
+      <p:sp>
+        <p:nvSpPr>
+          <p:cNvPr id="6" name="Slide Number Placeholder 3"/>
+          <p:cNvSpPr>
+            <a:spLocks noGrp="1"/>
+          </p:cNvSpPr>
+          <p:nvPr>
+            <p:ph type="sldNum" sz="quarter" idx="12"/>
+          </p:nvPr>
+        </p:nvSpPr>
+        <p:spPr>
+          <a:xfrm>
+            <a:off x="4305300" y="6356350"/>
+            <a:ext cx="533400" cy="365125"/>
+          </a:xfrm>
+        </p:spPr>
+        <p:txBody>
+          <a:bodyPr/>
+          <a:lstStyle/>
+          <a:p>
+            <a:pPr>
+              <a:defRPr/>
+            </a:pPr>
+            <a:fld id="{FFC8DA91-1027-405E-982D-FEC1575099C3}" type="slidenum">
+              <a:rPr lang="en-US" smtClean="0"/>
+              <a:pPr>
+                <a:defRPr/>
+              </a:pPr>
+              <a:t>10</a:t>
+            </a:fld>
+            <a:endParaRPr lang="en-US" dirty="0"/>
+          </a:p>
+        </p:txBody>
+      </p:sp>
+    </p:spTree>
+    <p:extLst>
+      <p:ext uri="{BB962C8B-B14F-4D97-AF65-F5344CB8AC3E}">
+        <p14:creationId xmlns:p14="http://schemas.microsoft.com/office/powerpoint/2010/main" val="1646537107"/>
+      </p:ext>
+    </p:extLst>
+  </p:cSld>
+  <p:clrMapOvr>
+    <a:masterClrMapping/>
+  </p:clrMapOvr>
+</p:sld>
+</file>
+
+<file path=ppt/slides/slide11.xml><?xml version="1.0" encoding="utf-8"?>
+<p:sld xmlns:a="http://schemas.openxmlformats.org/drawingml/2006/main" xmlns:r="http://schemas.openxmlformats.org/officeDocument/2006/relationships" xmlns:p="http://schemas.openxmlformats.org/presentationml/2006/main">
+  <p:cSld>
+    <p:spTree>
+      <p:nvGrpSpPr>
+        <p:cNvPr id="1" name=""/>
+        <p:cNvGrpSpPr/>
+        <p:nvPr/>
+      </p:nvGrpSpPr>
+      <p:grpSpPr>
+        <a:xfrm>
+          <a:off x="0" y="0"/>
+          <a:ext cx="0" cy="0"/>
+          <a:chOff x="0" y="0"/>
+          <a:chExt cx="0" cy="0"/>
+        </a:xfrm>
+      </p:grpSpPr>
+      <p:sp>
+        <p:nvSpPr>
+          <p:cNvPr id="2" name="Title 1"/>
+          <p:cNvSpPr>
+            <a:spLocks noGrp="1"/>
+          </p:cNvSpPr>
+          <p:nvPr>
+            <p:ph type="title"/>
+          </p:nvPr>
+        </p:nvSpPr>
+        <p:spPr/>
+        <p:txBody>
+          <a:bodyPr/>
+          <a:lstStyle/>
+          <a:p>
+            <a:r>
+              <a:rPr lang="en-US" dirty="0" smtClean="0"/>
+              <a:t>Why </a:t>
+            </a:r>
+            <a:r>
+              <a:rPr lang="en-US" dirty="0" err="1" smtClean="0"/>
+              <a:t>Git</a:t>
+            </a:r>
+            <a:r>
+              <a:rPr lang="en-US" dirty="0" smtClean="0"/>
+              <a:t>?</a:t>
+            </a:r>
+            <a:br>
+              <a:rPr lang="en-US" dirty="0" smtClean="0"/>
+            </a:br>
+            <a:r>
+              <a:rPr lang="en-US" dirty="0" smtClean="0"/>
+              <a:t>Performance</a:t>
+            </a:r>
+            <a:endParaRPr lang="en-US" dirty="0"/>
+          </a:p>
+        </p:txBody>
+      </p:sp>
+      <p:sp>
+        <p:nvSpPr>
+          <p:cNvPr id="3" name="Content Placeholder 2"/>
+          <p:cNvSpPr>
+            <a:spLocks noGrp="1"/>
+          </p:cNvSpPr>
+          <p:nvPr>
+            <p:ph idx="1"/>
+          </p:nvPr>
+        </p:nvSpPr>
+        <p:spPr/>
+        <p:txBody>
+          <a:bodyPr/>
+          <a:lstStyle/>
+          <a:p>
+            <a:r>
+              <a:rPr lang="en-US" dirty="0" smtClean="0"/>
+              <a:t>Almost all operations are local</a:t>
+            </a:r>
+          </a:p>
+          <a:p>
+            <a:r>
+              <a:rPr lang="en-US" dirty="0"/>
+              <a:t>2-step </a:t>
+            </a:r>
+            <a:r>
+              <a:rPr lang="en-US" dirty="0" smtClean="0"/>
+              <a:t>commit process</a:t>
+            </a:r>
+          </a:p>
+          <a:p>
+            <a:pPr lvl="1"/>
+            <a:r>
+              <a:rPr lang="en-US" dirty="0" smtClean="0"/>
+              <a:t>Commit </a:t>
+            </a:r>
+            <a:r>
+              <a:rPr lang="en-US" dirty="0"/>
+              <a:t>to </a:t>
+            </a:r>
+            <a:r>
+              <a:rPr lang="en-US" dirty="0" smtClean="0"/>
+              <a:t>local repo</a:t>
+            </a:r>
+          </a:p>
+          <a:p>
+            <a:pPr lvl="1"/>
+            <a:r>
+              <a:rPr lang="en-US" dirty="0" smtClean="0"/>
+              <a:t>Push local changes to remote</a:t>
+            </a:r>
+            <a:endParaRPr lang="en-US" dirty="0"/>
+          </a:p>
+          <a:p>
+            <a:endParaRPr lang="en-US" dirty="0"/>
+          </a:p>
+        </p:txBody>
+      </p:sp>
+      <p:sp>
+        <p:nvSpPr>
+          <p:cNvPr id="6" name="Slide Number Placeholder 3"/>
+          <p:cNvSpPr>
+            <a:spLocks noGrp="1"/>
+          </p:cNvSpPr>
+          <p:nvPr>
+            <p:ph type="sldNum" sz="quarter" idx="12"/>
+          </p:nvPr>
+        </p:nvSpPr>
+        <p:spPr>
+          <a:xfrm>
+            <a:off x="4305300" y="6356350"/>
+            <a:ext cx="533400" cy="365125"/>
+          </a:xfrm>
+        </p:spPr>
+        <p:txBody>
+          <a:bodyPr/>
+          <a:lstStyle/>
+          <a:p>
+            <a:pPr>
+              <a:defRPr/>
+            </a:pPr>
+            <a:fld id="{FFC8DA91-1027-405E-982D-FEC1575099C3}" type="slidenum">
+              <a:rPr lang="en-US" smtClean="0"/>
+              <a:pPr>
+                <a:defRPr/>
+              </a:pPr>
+              <a:t>11</a:t>
+            </a:fld>
+            <a:endParaRPr lang="en-US" dirty="0"/>
+          </a:p>
+        </p:txBody>
+      </p:sp>
+    </p:spTree>
+    <p:extLst>
+      <p:ext uri="{BB962C8B-B14F-4D97-AF65-F5344CB8AC3E}">
+        <p14:creationId xmlns:p14="http://schemas.microsoft.com/office/powerpoint/2010/main" val="2081199674"/>
+      </p:ext>
+    </p:extLst>
+  </p:cSld>
+  <p:clrMapOvr>
+    <a:masterClrMapping/>
+  </p:clrMapOvr>
+</p:sld>
+</file>
+
+<file path=ppt/slides/slide12.xml><?xml version="1.0" encoding="utf-8"?>
+<p:sld xmlns:a="http://schemas.openxmlformats.org/drawingml/2006/main" xmlns:r="http://schemas.openxmlformats.org/officeDocument/2006/relationships" xmlns:p="http://schemas.openxmlformats.org/presentationml/2006/main">
+  <p:cSld>
+    <p:spTree>
+      <p:nvGrpSpPr>
+        <p:cNvPr id="1" name=""/>
+        <p:cNvGrpSpPr/>
+        <p:nvPr/>
+      </p:nvGrpSpPr>
+      <p:grpSpPr>
+        <a:xfrm>
+          <a:off x="0" y="0"/>
+          <a:ext cx="0" cy="0"/>
+          <a:chOff x="0" y="0"/>
+          <a:chExt cx="0" cy="0"/>
+        </a:xfrm>
+      </p:grpSpPr>
+      <p:sp>
+        <p:nvSpPr>
+          <p:cNvPr id="2" name="Title 1"/>
+          <p:cNvSpPr>
+            <a:spLocks noGrp="1"/>
+          </p:cNvSpPr>
+          <p:nvPr>
+            <p:ph type="title"/>
+          </p:nvPr>
+        </p:nvSpPr>
+        <p:spPr/>
+        <p:txBody>
+          <a:bodyPr/>
+          <a:lstStyle/>
+          <a:p>
+            <a:r>
+              <a:rPr lang="en-US" dirty="0" smtClean="0"/>
+              <a:t>Why </a:t>
+            </a:r>
+            <a:r>
+              <a:rPr lang="en-US" dirty="0" err="1" smtClean="0"/>
+              <a:t>Git</a:t>
+            </a:r>
+            <a:r>
+              <a:rPr lang="en-US" dirty="0" smtClean="0"/>
+              <a:t>?</a:t>
+            </a:r>
+            <a:br>
+              <a:rPr lang="en-US" dirty="0" smtClean="0"/>
+            </a:br>
+            <a:r>
+              <a:rPr lang="en-US" dirty="0" smtClean="0"/>
+              <a:t>Cheap Branching</a:t>
+            </a:r>
+            <a:endParaRPr lang="en-US" dirty="0"/>
+          </a:p>
+        </p:txBody>
+      </p:sp>
+      <p:sp>
+        <p:nvSpPr>
+          <p:cNvPr id="3" name="Content Placeholder 2"/>
+          <p:cNvSpPr>
+            <a:spLocks noGrp="1"/>
+          </p:cNvSpPr>
+          <p:nvPr>
+            <p:ph idx="1"/>
+          </p:nvPr>
+        </p:nvSpPr>
+        <p:spPr/>
+        <p:txBody>
+          <a:bodyPr/>
+          <a:lstStyle/>
+          <a:p>
+            <a:r>
+              <a:rPr lang="en-US" dirty="0" smtClean="0"/>
+              <a:t>Safe context-switching</a:t>
+            </a:r>
+          </a:p>
+          <a:p>
+            <a:pPr lvl="1"/>
+            <a:r>
+              <a:rPr lang="en-US" dirty="0" smtClean="0"/>
+              <a:t>Feature branches</a:t>
+            </a:r>
+          </a:p>
+          <a:p>
+            <a:pPr lvl="1"/>
+            <a:r>
+              <a:rPr lang="en-US" dirty="0" smtClean="0"/>
+              <a:t>Stash</a:t>
+            </a:r>
+            <a:endParaRPr lang="en-US" dirty="0"/>
+          </a:p>
+        </p:txBody>
+      </p:sp>
+      <p:pic>
+        <p:nvPicPr>
+          <p:cNvPr id="4" name="Picture 3"/>
+          <p:cNvPicPr>
+            <a:picLocks noChangeAspect="1"/>
+          </p:cNvPicPr>
+          <p:nvPr/>
+        </p:nvPicPr>
+        <p:blipFill>
+          <a:blip r:embed="rId2"/>
+          <a:stretch>
+            <a:fillRect/>
+          </a:stretch>
+        </p:blipFill>
+        <p:spPr>
+          <a:xfrm>
+            <a:off x="1443849" y="4230414"/>
+            <a:ext cx="2586923" cy="2259724"/>
+          </a:xfrm>
+          <a:prstGeom prst="rect">
+            <a:avLst/>
+          </a:prstGeom>
+        </p:spPr>
+      </p:pic>
+      <p:pic>
+        <p:nvPicPr>
+          <p:cNvPr id="6" name="Picture 5"/>
+          <p:cNvPicPr>
+            <a:picLocks noChangeAspect="1"/>
+          </p:cNvPicPr>
+          <p:nvPr/>
+        </p:nvPicPr>
+        <p:blipFill>
+          <a:blip r:embed="rId3"/>
+          <a:stretch>
+            <a:fillRect/>
+          </a:stretch>
+        </p:blipFill>
+        <p:spPr>
+          <a:xfrm>
+            <a:off x="4697022" y="4230414"/>
+            <a:ext cx="2635207" cy="2259724"/>
+          </a:xfrm>
+          <a:prstGeom prst="rect">
+            <a:avLst/>
+          </a:prstGeom>
+        </p:spPr>
+      </p:pic>
+      <p:sp>
+        <p:nvSpPr>
+          <p:cNvPr id="7" name="Slide Number Placeholder 3"/>
+          <p:cNvSpPr>
+            <a:spLocks noGrp="1"/>
+          </p:cNvSpPr>
+          <p:nvPr>
+            <p:ph type="sldNum" sz="quarter" idx="12"/>
+          </p:nvPr>
+        </p:nvSpPr>
+        <p:spPr>
+          <a:xfrm>
+            <a:off x="4305300" y="6356350"/>
+            <a:ext cx="533400" cy="365125"/>
+          </a:xfrm>
+        </p:spPr>
+        <p:txBody>
+          <a:bodyPr/>
+          <a:lstStyle/>
+          <a:p>
+            <a:pPr>
+              <a:defRPr/>
+            </a:pPr>
+            <a:fld id="{FFC8DA91-1027-405E-982D-FEC1575099C3}" type="slidenum">
+              <a:rPr lang="en-US" smtClean="0"/>
+              <a:pPr>
+                <a:defRPr/>
+              </a:pPr>
+              <a:t>12</a:t>
+            </a:fld>
+            <a:endParaRPr lang="en-US" dirty="0"/>
+          </a:p>
+        </p:txBody>
+      </p:sp>
+    </p:spTree>
+    <p:extLst>
+      <p:ext uri="{BB962C8B-B14F-4D97-AF65-F5344CB8AC3E}">
+        <p14:creationId xmlns:p14="http://schemas.microsoft.com/office/powerpoint/2010/main" val="2364529333"/>
+      </p:ext>
+    </p:extLst>
+  </p:cSld>
+  <p:clrMapOvr>
+    <a:masterClrMapping/>
+  </p:clrMapOvr>
+</p:sld>
+</file>
+
+<file path=ppt/slides/slide13.xml><?xml version="1.0" encoding="utf-8"?>
+<p:sld xmlns:a="http://schemas.openxmlformats.org/drawingml/2006/main" xmlns:r="http://schemas.openxmlformats.org/officeDocument/2006/relationships" xmlns:p="http://schemas.openxmlformats.org/presentationml/2006/main">
+  <p:cSld>
+    <p:spTree>
+      <p:nvGrpSpPr>
+        <p:cNvPr id="1" name=""/>
+        <p:cNvGrpSpPr/>
+        <p:nvPr/>
+      </p:nvGrpSpPr>
+      <p:grpSpPr>
+        <a:xfrm>
+          <a:off x="0" y="0"/>
+          <a:ext cx="0" cy="0"/>
+          <a:chOff x="0" y="0"/>
+          <a:chExt cx="0" cy="0"/>
+        </a:xfrm>
+      </p:grpSpPr>
+      <p:sp>
+        <p:nvSpPr>
+          <p:cNvPr id="2" name="Title 1"/>
+          <p:cNvSpPr>
+            <a:spLocks noGrp="1"/>
+          </p:cNvSpPr>
+          <p:nvPr>
+            <p:ph type="title"/>
+          </p:nvPr>
+        </p:nvSpPr>
+        <p:spPr/>
+        <p:txBody>
+          <a:bodyPr/>
+          <a:lstStyle/>
+          <a:p>
+            <a:r>
+              <a:rPr lang="en-US" dirty="0" smtClean="0"/>
+              <a:t>Why </a:t>
+            </a:r>
+            <a:r>
+              <a:rPr lang="en-US" dirty="0" err="1" smtClean="0"/>
+              <a:t>Git</a:t>
+            </a:r>
+            <a:r>
+              <a:rPr lang="en-US" dirty="0" smtClean="0"/>
+              <a:t>?</a:t>
+            </a:r>
+            <a:br>
+              <a:rPr lang="en-US" dirty="0" smtClean="0"/>
+            </a:br>
+            <a:r>
+              <a:rPr lang="en-US" dirty="0" smtClean="0"/>
+              <a:t>Multiple Merge Strategies</a:t>
+            </a:r>
+            <a:endParaRPr lang="en-US" dirty="0"/>
+          </a:p>
+        </p:txBody>
+      </p:sp>
+      <p:pic>
+        <p:nvPicPr>
+          <p:cNvPr id="5" name="Picture 4"/>
+          <p:cNvPicPr>
+            <a:picLocks noChangeAspect="1"/>
+          </p:cNvPicPr>
+          <p:nvPr/>
+        </p:nvPicPr>
+        <p:blipFill>
+          <a:blip r:embed="rId2"/>
+          <a:stretch>
+            <a:fillRect/>
+          </a:stretch>
+        </p:blipFill>
+        <p:spPr>
+          <a:xfrm>
+            <a:off x="1737638" y="2951653"/>
+            <a:ext cx="2429284" cy="3485494"/>
+          </a:xfrm>
+          <a:prstGeom prst="rect">
+            <a:avLst/>
+          </a:prstGeom>
+        </p:spPr>
+      </p:pic>
+      <p:pic>
+        <p:nvPicPr>
+          <p:cNvPr id="6" name="Picture 5"/>
+          <p:cNvPicPr>
+            <a:picLocks noChangeAspect="1"/>
+          </p:cNvPicPr>
+          <p:nvPr/>
+        </p:nvPicPr>
+        <p:blipFill>
+          <a:blip r:embed="rId3"/>
+          <a:stretch>
+            <a:fillRect/>
+          </a:stretch>
+        </p:blipFill>
+        <p:spPr>
+          <a:xfrm>
+            <a:off x="5030003" y="2951653"/>
+            <a:ext cx="2151539" cy="3485493"/>
+          </a:xfrm>
+          <a:prstGeom prst="rect">
+            <a:avLst/>
+          </a:prstGeom>
+        </p:spPr>
+      </p:pic>
+      <p:sp>
+        <p:nvSpPr>
+          <p:cNvPr id="7" name="TextBox 6"/>
+          <p:cNvSpPr txBox="1"/>
+          <p:nvPr/>
+        </p:nvSpPr>
+        <p:spPr>
+          <a:xfrm>
+            <a:off x="2250983" y="2504966"/>
+            <a:ext cx="1541518" cy="369332"/>
+          </a:xfrm>
+          <a:prstGeom prst="rect">
+            <a:avLst/>
+          </a:prstGeom>
+          <a:noFill/>
+        </p:spPr>
+        <p:txBody>
+          <a:bodyPr wrap="square" rtlCol="0">
+            <a:spAutoFit/>
+          </a:bodyPr>
+          <a:lstStyle/>
+          <a:p>
+            <a:r>
+              <a:rPr lang="en-US" dirty="0" smtClean="0"/>
+              <a:t>Fast Forward</a:t>
+            </a:r>
+            <a:endParaRPr lang="en-US" dirty="0"/>
+          </a:p>
+        </p:txBody>
+      </p:sp>
+      <p:sp>
+        <p:nvSpPr>
+          <p:cNvPr id="8" name="TextBox 7"/>
+          <p:cNvSpPr txBox="1"/>
+          <p:nvPr/>
+        </p:nvSpPr>
+        <p:spPr>
+          <a:xfrm>
+            <a:off x="5757938" y="2504966"/>
+            <a:ext cx="907393" cy="369332"/>
+          </a:xfrm>
+          <a:prstGeom prst="rect">
+            <a:avLst/>
+          </a:prstGeom>
+          <a:noFill/>
+        </p:spPr>
+        <p:txBody>
+          <a:bodyPr wrap="square" rtlCol="0">
+            <a:spAutoFit/>
+          </a:bodyPr>
+          <a:lstStyle/>
+          <a:p>
+            <a:r>
+              <a:rPr lang="en-US" dirty="0" smtClean="0"/>
+              <a:t>3-way</a:t>
+            </a:r>
+            <a:endParaRPr lang="en-US" dirty="0"/>
+          </a:p>
+        </p:txBody>
+      </p:sp>
+      <p:sp>
+        <p:nvSpPr>
+          <p:cNvPr id="9" name="Slide Number Placeholder 3"/>
+          <p:cNvSpPr>
+            <a:spLocks noGrp="1"/>
+          </p:cNvSpPr>
+          <p:nvPr>
+            <p:ph type="sldNum" sz="quarter" idx="12"/>
+          </p:nvPr>
+        </p:nvSpPr>
+        <p:spPr>
+          <a:xfrm>
+            <a:off x="4305300" y="6356350"/>
+            <a:ext cx="533400" cy="365125"/>
+          </a:xfrm>
+        </p:spPr>
+        <p:txBody>
+          <a:bodyPr/>
+          <a:lstStyle/>
+          <a:p>
+            <a:pPr>
+              <a:defRPr/>
+            </a:pPr>
+            <a:fld id="{FFC8DA91-1027-405E-982D-FEC1575099C3}" type="slidenum">
+              <a:rPr lang="en-US" smtClean="0"/>
+              <a:pPr>
+                <a:defRPr/>
+              </a:pPr>
+              <a:t>13</a:t>
+            </a:fld>
+            <a:endParaRPr lang="en-US" dirty="0"/>
+          </a:p>
+        </p:txBody>
+      </p:sp>
+    </p:spTree>
+    <p:extLst>
+      <p:ext uri="{BB962C8B-B14F-4D97-AF65-F5344CB8AC3E}">
+        <p14:creationId xmlns:p14="http://schemas.microsoft.com/office/powerpoint/2010/main" val="982273809"/>
+      </p:ext>
+    </p:extLst>
+  </p:cSld>
+  <p:clrMapOvr>
+    <a:masterClrMapping/>
+  </p:clrMapOvr>
+</p:sld>
+</file>
+
+<file path=ppt/slides/slide14.xml><?xml version="1.0" encoding="utf-8"?>
+<p:sld xmlns:a="http://schemas.openxmlformats.org/drawingml/2006/main" xmlns:r="http://schemas.openxmlformats.org/officeDocument/2006/relationships" xmlns:p="http://schemas.openxmlformats.org/presentationml/2006/main">
+  <p:cSld>
+    <p:spTree>
+      <p:nvGrpSpPr>
+        <p:cNvPr id="1" name=""/>
+        <p:cNvGrpSpPr/>
+        <p:nvPr/>
+      </p:nvGrpSpPr>
+      <p:grpSpPr>
+        <a:xfrm>
+          <a:off x="0" y="0"/>
+          <a:ext cx="0" cy="0"/>
+          <a:chOff x="0" y="0"/>
+          <a:chExt cx="0" cy="0"/>
+        </a:xfrm>
+      </p:grpSpPr>
+      <p:sp>
+        <p:nvSpPr>
+          <p:cNvPr id="2" name="Title 1"/>
+          <p:cNvSpPr>
+            <a:spLocks noGrp="1"/>
+          </p:cNvSpPr>
+          <p:nvPr>
+            <p:ph type="title"/>
+          </p:nvPr>
+        </p:nvSpPr>
+        <p:spPr/>
+        <p:txBody>
+          <a:bodyPr/>
+          <a:lstStyle/>
+          <a:p>
+            <a:r>
+              <a:rPr lang="en-US" dirty="0" smtClean="0"/>
+              <a:t>Why </a:t>
+            </a:r>
+            <a:r>
+              <a:rPr lang="en-US" dirty="0" err="1" smtClean="0"/>
+              <a:t>Git</a:t>
+            </a:r>
+            <a:r>
+              <a:rPr lang="en-US" dirty="0" smtClean="0"/>
+              <a:t>?</a:t>
+            </a:r>
+            <a:br>
+              <a:rPr lang="en-US" dirty="0" smtClean="0"/>
+            </a:br>
+            <a:r>
+              <a:rPr lang="en-US" dirty="0" smtClean="0"/>
+              <a:t>Flexible Governance Schemes</a:t>
+            </a:r>
+            <a:endParaRPr lang="en-US" dirty="0"/>
+          </a:p>
+        </p:txBody>
+      </p:sp>
+      <p:pic>
+        <p:nvPicPr>
+          <p:cNvPr id="3" name="Picture 2"/>
+          <p:cNvPicPr>
+            <a:picLocks noChangeAspect="1"/>
+          </p:cNvPicPr>
+          <p:nvPr/>
+        </p:nvPicPr>
+        <p:blipFill>
+          <a:blip r:embed="rId2"/>
+          <a:stretch>
+            <a:fillRect/>
+          </a:stretch>
+        </p:blipFill>
+        <p:spPr>
+          <a:xfrm>
+            <a:off x="1318173" y="3015149"/>
+            <a:ext cx="6350000" cy="3175000"/>
+          </a:xfrm>
+          <a:prstGeom prst="rect">
+            <a:avLst/>
+          </a:prstGeom>
+        </p:spPr>
+      </p:pic>
+      <p:sp>
+        <p:nvSpPr>
+          <p:cNvPr id="9" name="Slide Number Placeholder 3"/>
+          <p:cNvSpPr>
+            <a:spLocks noGrp="1"/>
+          </p:cNvSpPr>
+          <p:nvPr>
+            <p:ph type="sldNum" sz="quarter" idx="12"/>
+          </p:nvPr>
+        </p:nvSpPr>
+        <p:spPr>
+          <a:xfrm>
+            <a:off x="4305300" y="6356350"/>
+            <a:ext cx="533400" cy="365125"/>
+          </a:xfrm>
+        </p:spPr>
+        <p:txBody>
+          <a:bodyPr/>
+          <a:lstStyle/>
+          <a:p>
+            <a:pPr>
+              <a:defRPr/>
+            </a:pPr>
+            <a:fld id="{FFC8DA91-1027-405E-982D-FEC1575099C3}" type="slidenum">
+              <a:rPr lang="en-US" smtClean="0"/>
+              <a:pPr>
+                <a:defRPr/>
+              </a:pPr>
+              <a:t>14</a:t>
+            </a:fld>
+            <a:endParaRPr lang="en-US" dirty="0"/>
+          </a:p>
+        </p:txBody>
+      </p:sp>
+    </p:spTree>
+    <p:extLst>
+      <p:ext uri="{BB962C8B-B14F-4D97-AF65-F5344CB8AC3E}">
+        <p14:creationId xmlns:p14="http://schemas.microsoft.com/office/powerpoint/2010/main" val="880818246"/>
+      </p:ext>
+    </p:extLst>
+  </p:cSld>
+  <p:clrMapOvr>
+    <a:masterClrMapping/>
+  </p:clrMapOvr>
+</p:sld>
+</file>
+
+<file path=ppt/slides/slide15.xml><?xml version="1.0" encoding="utf-8"?>
+<p:sld xmlns:a="http://schemas.openxmlformats.org/drawingml/2006/main" xmlns:r="http://schemas.openxmlformats.org/officeDocument/2006/relationships" xmlns:p="http://schemas.openxmlformats.org/presentationml/2006/main">
+  <p:cSld>
+    <p:spTree>
+      <p:nvGrpSpPr>
+        <p:cNvPr id="1" name=""/>
+        <p:cNvGrpSpPr/>
+        <p:nvPr/>
+      </p:nvGrpSpPr>
+      <p:grpSpPr>
+        <a:xfrm>
+          <a:off x="0" y="0"/>
+          <a:ext cx="0" cy="0"/>
+          <a:chOff x="0" y="0"/>
+          <a:chExt cx="0" cy="0"/>
+        </a:xfrm>
+      </p:grpSpPr>
+      <p:sp>
+        <p:nvSpPr>
+          <p:cNvPr id="2" name="Title 1"/>
+          <p:cNvSpPr>
+            <a:spLocks noGrp="1"/>
+          </p:cNvSpPr>
+          <p:nvPr>
+            <p:ph type="title"/>
+          </p:nvPr>
+        </p:nvSpPr>
+        <p:spPr/>
+        <p:txBody>
+          <a:bodyPr/>
+          <a:lstStyle/>
+          <a:p>
+            <a:r>
+              <a:rPr lang="en-US" dirty="0" smtClean="0"/>
+              <a:t>Why </a:t>
+            </a:r>
+            <a:r>
+              <a:rPr lang="en-US" dirty="0" err="1" smtClean="0"/>
+              <a:t>Git</a:t>
+            </a:r>
+            <a:r>
+              <a:rPr lang="en-US" dirty="0" smtClean="0"/>
+              <a:t>?</a:t>
+            </a:r>
+            <a:br>
+              <a:rPr lang="en-US" dirty="0" smtClean="0"/>
+            </a:br>
+            <a:r>
+              <a:rPr lang="en-US" dirty="0" smtClean="0"/>
+              <a:t>Flexible Governance Schemes</a:t>
+            </a:r>
+            <a:endParaRPr lang="en-US" dirty="0"/>
+          </a:p>
+        </p:txBody>
+      </p:sp>
+      <p:pic>
+        <p:nvPicPr>
+          <p:cNvPr id="4" name="Picture 3"/>
+          <p:cNvPicPr>
+            <a:picLocks noChangeAspect="1"/>
+          </p:cNvPicPr>
+          <p:nvPr/>
+        </p:nvPicPr>
+        <p:blipFill>
+          <a:blip r:embed="rId2"/>
+          <a:stretch>
+            <a:fillRect/>
+          </a:stretch>
+        </p:blipFill>
+        <p:spPr>
+          <a:xfrm>
+            <a:off x="1064172" y="3118069"/>
+            <a:ext cx="6849718" cy="2767286"/>
+          </a:xfrm>
+          <a:prstGeom prst="rect">
+            <a:avLst/>
+          </a:prstGeom>
+        </p:spPr>
+      </p:pic>
+      <p:sp>
+        <p:nvSpPr>
+          <p:cNvPr id="5" name="Slide Number Placeholder 3"/>
+          <p:cNvSpPr>
+            <a:spLocks noGrp="1"/>
+          </p:cNvSpPr>
+          <p:nvPr>
+            <p:ph type="sldNum" sz="quarter" idx="12"/>
+          </p:nvPr>
+        </p:nvSpPr>
+        <p:spPr>
+          <a:xfrm>
+            <a:off x="4305300" y="6356350"/>
+            <a:ext cx="533400" cy="365125"/>
+          </a:xfrm>
+        </p:spPr>
+        <p:txBody>
+          <a:bodyPr/>
+          <a:lstStyle/>
+          <a:p>
+            <a:pPr>
+              <a:defRPr/>
+            </a:pPr>
+            <a:fld id="{FFC8DA91-1027-405E-982D-FEC1575099C3}" type="slidenum">
+              <a:rPr lang="en-US" smtClean="0"/>
+              <a:pPr>
+                <a:defRPr/>
+              </a:pPr>
+              <a:t>15</a:t>
+            </a:fld>
+            <a:endParaRPr lang="en-US" dirty="0"/>
+          </a:p>
+        </p:txBody>
+      </p:sp>
+    </p:spTree>
+    <p:extLst>
+      <p:ext uri="{BB962C8B-B14F-4D97-AF65-F5344CB8AC3E}">
+        <p14:creationId xmlns:p14="http://schemas.microsoft.com/office/powerpoint/2010/main" val="4251385720"/>
+      </p:ext>
+    </p:extLst>
+  </p:cSld>
+  <p:clrMapOvr>
+    <a:masterClrMapping/>
+  </p:clrMapOvr>
+</p:sld>
+</file>
+
+<file path=ppt/slides/slide16.xml><?xml version="1.0" encoding="utf-8"?>
+<p:sld xmlns:a="http://schemas.openxmlformats.org/drawingml/2006/main" xmlns:r="http://schemas.openxmlformats.org/officeDocument/2006/relationships" xmlns:p="http://schemas.openxmlformats.org/presentationml/2006/main">
+  <p:cSld>
+    <p:spTree>
+      <p:nvGrpSpPr>
+        <p:cNvPr id="1" name=""/>
+        <p:cNvGrpSpPr/>
+        <p:nvPr/>
+      </p:nvGrpSpPr>
+      <p:grpSpPr>
+        <a:xfrm>
+          <a:off x="0" y="0"/>
+          <a:ext cx="0" cy="0"/>
+          <a:chOff x="0" y="0"/>
+          <a:chExt cx="0" cy="0"/>
+        </a:xfrm>
+      </p:grpSpPr>
+      <p:sp>
+        <p:nvSpPr>
+          <p:cNvPr id="2" name="Title 1"/>
+          <p:cNvSpPr>
+            <a:spLocks noGrp="1"/>
+          </p:cNvSpPr>
+          <p:nvPr>
+            <p:ph type="title"/>
+          </p:nvPr>
+        </p:nvSpPr>
+        <p:spPr/>
+        <p:txBody>
+          <a:bodyPr/>
+          <a:lstStyle/>
+          <a:p>
+            <a:r>
+              <a:rPr lang="en-US" dirty="0" smtClean="0"/>
+              <a:t>Why </a:t>
+            </a:r>
+            <a:r>
+              <a:rPr lang="en-US" dirty="0" err="1" smtClean="0"/>
+              <a:t>Git</a:t>
+            </a:r>
+            <a:r>
+              <a:rPr lang="en-US" dirty="0" smtClean="0"/>
+              <a:t>?</a:t>
+            </a:r>
+            <a:br>
+              <a:rPr lang="en-US" dirty="0" smtClean="0"/>
+            </a:br>
+            <a:r>
+              <a:rPr lang="en-US" dirty="0" smtClean="0"/>
+              <a:t>Flexible Governance Schemes</a:t>
+            </a:r>
+            <a:endParaRPr lang="en-US" dirty="0"/>
+          </a:p>
+        </p:txBody>
+      </p:sp>
+      <p:pic>
+        <p:nvPicPr>
+          <p:cNvPr id="3" name="Picture 2"/>
+          <p:cNvPicPr>
+            <a:picLocks noChangeAspect="1"/>
+          </p:cNvPicPr>
+          <p:nvPr/>
+        </p:nvPicPr>
+        <p:blipFill>
+          <a:blip r:embed="rId2"/>
+          <a:stretch>
+            <a:fillRect/>
+          </a:stretch>
+        </p:blipFill>
+        <p:spPr>
+          <a:xfrm>
+            <a:off x="1899800" y="2478690"/>
+            <a:ext cx="5344400" cy="3986923"/>
+          </a:xfrm>
+          <a:prstGeom prst="rect">
+            <a:avLst/>
+          </a:prstGeom>
+        </p:spPr>
+      </p:pic>
+      <p:sp>
+        <p:nvSpPr>
+          <p:cNvPr id="5" name="Slide Number Placeholder 3"/>
+          <p:cNvSpPr>
+            <a:spLocks noGrp="1"/>
+          </p:cNvSpPr>
+          <p:nvPr>
+            <p:ph type="sldNum" sz="quarter" idx="12"/>
+          </p:nvPr>
+        </p:nvSpPr>
+        <p:spPr>
+          <a:xfrm>
+            <a:off x="4305300" y="6356350"/>
+            <a:ext cx="533400" cy="365125"/>
+          </a:xfrm>
+        </p:spPr>
+        <p:txBody>
+          <a:bodyPr/>
+          <a:lstStyle/>
+          <a:p>
+            <a:pPr>
+              <a:defRPr/>
+            </a:pPr>
+            <a:fld id="{FFC8DA91-1027-405E-982D-FEC1575099C3}" type="slidenum">
+              <a:rPr lang="en-US" smtClean="0"/>
+              <a:pPr>
+                <a:defRPr/>
+              </a:pPr>
+              <a:t>16</a:t>
+            </a:fld>
+            <a:endParaRPr lang="en-US" dirty="0"/>
+          </a:p>
+        </p:txBody>
+      </p:sp>
+    </p:spTree>
+    <p:extLst>
+      <p:ext uri="{BB962C8B-B14F-4D97-AF65-F5344CB8AC3E}">
+        <p14:creationId xmlns:p14="http://schemas.microsoft.com/office/powerpoint/2010/main" val="3870238857"/>
+      </p:ext>
+    </p:extLst>
+  </p:cSld>
+  <p:clrMapOvr>
+    <a:masterClrMapping/>
+  </p:clrMapOvr>
+</p:sld>
+</file>
+
+<file path=ppt/slides/slide17.xml><?xml version="1.0" encoding="utf-8"?>
+<p:sld xmlns:a="http://schemas.openxmlformats.org/drawingml/2006/main" xmlns:r="http://schemas.openxmlformats.org/officeDocument/2006/relationships" xmlns:p="http://schemas.openxmlformats.org/presentationml/2006/main">
+  <p:cSld>
+    <p:spTree>
+      <p:nvGrpSpPr>
+        <p:cNvPr id="1" name=""/>
+        <p:cNvGrpSpPr/>
+        <p:nvPr/>
+      </p:nvGrpSpPr>
+      <p:grpSpPr>
+        <a:xfrm>
+          <a:off x="0" y="0"/>
+          <a:ext cx="0" cy="0"/>
+          <a:chOff x="0" y="0"/>
+          <a:chExt cx="0" cy="0"/>
+        </a:xfrm>
+      </p:grpSpPr>
+      <p:sp>
+        <p:nvSpPr>
+          <p:cNvPr id="2" name="Title 1"/>
+          <p:cNvSpPr>
+            <a:spLocks noGrp="1"/>
+          </p:cNvSpPr>
+          <p:nvPr>
+            <p:ph type="title"/>
+          </p:nvPr>
+        </p:nvSpPr>
+        <p:spPr/>
+        <p:txBody>
+          <a:bodyPr/>
+          <a:lstStyle/>
+          <a:p>
+            <a:r>
+              <a:rPr lang="en-US" dirty="0" smtClean="0"/>
+              <a:t>Why </a:t>
+            </a:r>
+            <a:r>
+              <a:rPr lang="en-US" dirty="0" err="1" smtClean="0"/>
+              <a:t>Git</a:t>
+            </a:r>
+            <a:r>
+              <a:rPr lang="en-US" dirty="0" smtClean="0"/>
+              <a:t>?</a:t>
+            </a:r>
+            <a:br>
+              <a:rPr lang="en-US" dirty="0" smtClean="0"/>
+            </a:br>
+            <a:r>
+              <a:rPr lang="en-US" dirty="0" smtClean="0"/>
+              <a:t>Flexible Governance Schemes</a:t>
+            </a:r>
+            <a:endParaRPr lang="en-US" dirty="0"/>
+          </a:p>
+        </p:txBody>
+      </p:sp>
+      <p:pic>
+        <p:nvPicPr>
+          <p:cNvPr id="4" name="Picture 3"/>
+          <p:cNvPicPr>
+            <a:picLocks noChangeAspect="1"/>
+          </p:cNvPicPr>
+          <p:nvPr/>
+        </p:nvPicPr>
+        <p:blipFill>
+          <a:blip r:embed="rId2"/>
+          <a:stretch>
+            <a:fillRect/>
+          </a:stretch>
+        </p:blipFill>
+        <p:spPr>
+          <a:xfrm>
+            <a:off x="1494659" y="2334613"/>
+            <a:ext cx="5678652" cy="1954061"/>
+          </a:xfrm>
+          <a:prstGeom prst="rect">
+            <a:avLst/>
+          </a:prstGeom>
+        </p:spPr>
+      </p:pic>
+      <p:pic>
+        <p:nvPicPr>
+          <p:cNvPr id="5" name="Picture 4"/>
+          <p:cNvPicPr>
+            <a:picLocks noChangeAspect="1"/>
+          </p:cNvPicPr>
+          <p:nvPr/>
+        </p:nvPicPr>
+        <p:blipFill>
+          <a:blip r:embed="rId3"/>
+          <a:stretch>
+            <a:fillRect/>
+          </a:stretch>
+        </p:blipFill>
+        <p:spPr>
+          <a:xfrm>
+            <a:off x="2565380" y="4151578"/>
+            <a:ext cx="3537211" cy="2349719"/>
+          </a:xfrm>
+          <a:prstGeom prst="rect">
+            <a:avLst/>
+          </a:prstGeom>
+        </p:spPr>
+      </p:pic>
+      <p:sp>
+        <p:nvSpPr>
+          <p:cNvPr id="6" name="Slide Number Placeholder 3"/>
+          <p:cNvSpPr>
+            <a:spLocks noGrp="1"/>
+          </p:cNvSpPr>
+          <p:nvPr>
+            <p:ph type="sldNum" sz="quarter" idx="12"/>
+          </p:nvPr>
+        </p:nvSpPr>
+        <p:spPr>
+          <a:xfrm>
+            <a:off x="4305300" y="6356350"/>
+            <a:ext cx="533400" cy="365125"/>
+          </a:xfrm>
+        </p:spPr>
+        <p:txBody>
+          <a:bodyPr/>
+          <a:lstStyle/>
+          <a:p>
+            <a:pPr>
+              <a:defRPr/>
+            </a:pPr>
+            <a:fld id="{FFC8DA91-1027-405E-982D-FEC1575099C3}" type="slidenum">
+              <a:rPr lang="en-US" smtClean="0"/>
+              <a:pPr>
+                <a:defRPr/>
+              </a:pPr>
+              <a:t>17</a:t>
+            </a:fld>
+            <a:endParaRPr lang="en-US" dirty="0"/>
+          </a:p>
+        </p:txBody>
+      </p:sp>
+    </p:spTree>
+    <p:extLst>
+      <p:ext uri="{BB962C8B-B14F-4D97-AF65-F5344CB8AC3E}">
+        <p14:creationId xmlns:p14="http://schemas.microsoft.com/office/powerpoint/2010/main" val="4168317386"/>
+      </p:ext>
+    </p:extLst>
+  </p:cSld>
+  <p:clrMapOvr>
+    <a:masterClrMapping/>
+  </p:clrMapOvr>
+</p:sld>
+</file>
+
+<file path=ppt/slides/slide18.xml><?xml version="1.0" encoding="utf-8"?>
+<p:sld xmlns:a="http://schemas.openxmlformats.org/drawingml/2006/main" xmlns:r="http://schemas.openxmlformats.org/officeDocument/2006/relationships" xmlns:p="http://schemas.openxmlformats.org/presentationml/2006/main">
+  <p:cSld>
+    <p:spTree>
+      <p:nvGrpSpPr>
+        <p:cNvPr id="1" name=""/>
+        <p:cNvGrpSpPr/>
+        <p:nvPr/>
+      </p:nvGrpSpPr>
+      <p:grpSpPr>
+        <a:xfrm>
+          <a:off x="0" y="0"/>
+          <a:ext cx="0" cy="0"/>
+          <a:chOff x="0" y="0"/>
+          <a:chExt cx="0" cy="0"/>
+        </a:xfrm>
+      </p:grpSpPr>
+      <p:sp>
+        <p:nvSpPr>
+          <p:cNvPr id="2" name="Title 1"/>
+          <p:cNvSpPr>
+            <a:spLocks noGrp="1"/>
+          </p:cNvSpPr>
+          <p:nvPr>
+            <p:ph type="title"/>
+          </p:nvPr>
+        </p:nvSpPr>
+        <p:spPr/>
+        <p:txBody>
+          <a:bodyPr/>
+          <a:lstStyle/>
+          <a:p>
+            <a:r>
+              <a:rPr lang="en-US" dirty="0" smtClean="0"/>
+              <a:t>Why </a:t>
+            </a:r>
+            <a:r>
+              <a:rPr lang="en-US" dirty="0" err="1" smtClean="0"/>
+              <a:t>Git</a:t>
+            </a:r>
+            <a:r>
+              <a:rPr lang="en-US" dirty="0" smtClean="0"/>
+              <a:t>?</a:t>
+            </a:r>
+            <a:br>
+              <a:rPr lang="en-US" dirty="0" smtClean="0"/>
+            </a:br>
+            <a:r>
+              <a:rPr lang="en-US" dirty="0" smtClean="0"/>
+              <a:t>Market Adoption</a:t>
+            </a:r>
+            <a:endParaRPr lang="en-US" dirty="0"/>
+          </a:p>
+        </p:txBody>
+      </p:sp>
+      <p:grpSp>
+        <p:nvGrpSpPr>
+          <p:cNvPr id="6" name="Group 5"/>
+          <p:cNvGrpSpPr/>
+          <p:nvPr/>
+        </p:nvGrpSpPr>
+        <p:grpSpPr>
+          <a:xfrm>
+            <a:off x="122615" y="3766203"/>
+            <a:ext cx="8931938" cy="2688019"/>
+            <a:chOff x="122615" y="3845034"/>
+            <a:chExt cx="8931938" cy="2688019"/>
+          </a:xfrm>
+        </p:grpSpPr>
+        <p:pic>
+          <p:nvPicPr>
+            <p:cNvPr id="5" name="Picture 4"/>
+            <p:cNvPicPr>
+              <a:picLocks noChangeAspect="1"/>
+            </p:cNvPicPr>
+            <p:nvPr/>
+          </p:nvPicPr>
+          <p:blipFill>
+            <a:blip r:embed="rId2"/>
+            <a:stretch>
+              <a:fillRect/>
+            </a:stretch>
+          </p:blipFill>
+          <p:spPr>
+            <a:xfrm>
+              <a:off x="4000434" y="3845034"/>
+              <a:ext cx="5054119" cy="2688019"/>
+            </a:xfrm>
+            <a:prstGeom prst="rect">
+              <a:avLst/>
+            </a:prstGeom>
+          </p:spPr>
+        </p:pic>
+        <p:pic>
+          <p:nvPicPr>
+            <p:cNvPr id="4" name="Picture 3"/>
+            <p:cNvPicPr>
+              <a:picLocks noChangeAspect="1"/>
+            </p:cNvPicPr>
+            <p:nvPr/>
+          </p:nvPicPr>
+          <p:blipFill>
+            <a:blip r:embed="rId3"/>
+            <a:stretch>
+              <a:fillRect/>
+            </a:stretch>
+          </p:blipFill>
+          <p:spPr>
+            <a:xfrm>
+              <a:off x="122615" y="3845034"/>
+              <a:ext cx="4883756" cy="2688019"/>
+            </a:xfrm>
+            <a:prstGeom prst="rect">
+              <a:avLst/>
+            </a:prstGeom>
+          </p:spPr>
+        </p:pic>
+      </p:grpSp>
+      <p:pic>
+        <p:nvPicPr>
+          <p:cNvPr id="8" name="Picture 7"/>
+          <p:cNvPicPr>
+            <a:picLocks noChangeAspect="1"/>
+          </p:cNvPicPr>
+          <p:nvPr/>
+        </p:nvPicPr>
+        <p:blipFill>
+          <a:blip r:embed="rId4"/>
+          <a:stretch>
+            <a:fillRect/>
+          </a:stretch>
+        </p:blipFill>
+        <p:spPr>
+          <a:xfrm>
+            <a:off x="0" y="2620130"/>
+            <a:ext cx="9144000" cy="1084082"/>
+          </a:xfrm>
+          <a:prstGeom prst="rect">
+            <a:avLst/>
+          </a:prstGeom>
+        </p:spPr>
+      </p:pic>
+      <p:sp>
+        <p:nvSpPr>
+          <p:cNvPr id="9" name="Slide Number Placeholder 3"/>
+          <p:cNvSpPr>
+            <a:spLocks noGrp="1"/>
+          </p:cNvSpPr>
+          <p:nvPr>
+            <p:ph type="sldNum" sz="quarter" idx="12"/>
+          </p:nvPr>
+        </p:nvSpPr>
+        <p:spPr>
+          <a:xfrm>
+            <a:off x="4305300" y="6356350"/>
+            <a:ext cx="533400" cy="365125"/>
+          </a:xfrm>
+        </p:spPr>
+        <p:txBody>
+          <a:bodyPr/>
+          <a:lstStyle/>
+          <a:p>
+            <a:pPr>
+              <a:defRPr/>
+            </a:pPr>
+            <a:fld id="{FFC8DA91-1027-405E-982D-FEC1575099C3}" type="slidenum">
+              <a:rPr lang="en-US" smtClean="0"/>
+              <a:pPr>
+                <a:defRPr/>
+              </a:pPr>
+              <a:t>18</a:t>
+            </a:fld>
+            <a:endParaRPr lang="en-US" dirty="0"/>
+          </a:p>
+        </p:txBody>
+      </p:sp>
+    </p:spTree>
+    <p:extLst>
+      <p:ext uri="{BB962C8B-B14F-4D97-AF65-F5344CB8AC3E}">
+        <p14:creationId xmlns:p14="http://schemas.microsoft.com/office/powerpoint/2010/main" val="142381576"/>
+      </p:ext>
+    </p:extLst>
+  </p:cSld>
+  <p:clrMapOvr>
+    <a:masterClrMapping/>
+  </p:clrMapOvr>
+</p:sld>
+</file>
+
+<file path=ppt/slides/slide19.xml><?xml version="1.0" encoding="utf-8"?>
+<p:sld xmlns:a="http://schemas.openxmlformats.org/drawingml/2006/main" xmlns:r="http://schemas.openxmlformats.org/officeDocument/2006/relationships" xmlns:p="http://schemas.openxmlformats.org/presentationml/2006/main">
+  <p:cSld>
+    <p:spTree>
+      <p:nvGrpSpPr>
+        <p:cNvPr id="1" name=""/>
+        <p:cNvGrpSpPr/>
+        <p:nvPr/>
+      </p:nvGrpSpPr>
+      <p:grpSpPr>
+        <a:xfrm>
+          <a:off x="0" y="0"/>
+          <a:ext cx="0" cy="0"/>
+          <a:chOff x="0" y="0"/>
+          <a:chExt cx="0" cy="0"/>
+        </a:xfrm>
+      </p:grpSpPr>
+      <p:sp>
+        <p:nvSpPr>
+          <p:cNvPr id="2" name="Title 1"/>
+          <p:cNvSpPr>
+            <a:spLocks noGrp="1"/>
+          </p:cNvSpPr>
+          <p:nvPr>
+            <p:ph type="title"/>
+          </p:nvPr>
+        </p:nvSpPr>
+        <p:spPr/>
+        <p:txBody>
+          <a:bodyPr>
+            <a:normAutofit fontScale="90000"/>
+          </a:bodyPr>
+          <a:lstStyle/>
+          <a:p>
+            <a:r>
+              <a:rPr lang="en-US" dirty="0" smtClean="0"/>
+              <a:t>Let’s take a look…</a:t>
+            </a:r>
+            <a:br>
+              <a:rPr lang="en-US" dirty="0" smtClean="0"/>
+            </a:br>
+            <a:r>
+              <a:rPr lang="en-US" dirty="0" smtClean="0"/>
+              <a:t>demo</a:t>
+            </a:r>
+            <a:endParaRPr lang="en-US" dirty="0"/>
+          </a:p>
+        </p:txBody>
+      </p:sp>
+      <p:pic>
+        <p:nvPicPr>
+          <p:cNvPr id="5" name="Content Placeholder 4"/>
+          <p:cNvPicPr>
+            <a:picLocks noGrp="1" noChangeAspect="1"/>
+          </p:cNvPicPr>
+          <p:nvPr>
+            <p:ph idx="1"/>
+          </p:nvPr>
+        </p:nvPicPr>
+        <p:blipFill>
+          <a:blip r:embed="rId2"/>
+          <a:srcRect t="14677" b="14677"/>
+          <a:stretch>
+            <a:fillRect/>
+          </a:stretch>
+        </p:blipFill>
+        <p:spPr/>
+      </p:pic>
+      <p:sp>
+        <p:nvSpPr>
+          <p:cNvPr id="4" name="Slide Number Placeholder 3"/>
+          <p:cNvSpPr>
+            <a:spLocks noGrp="1"/>
+          </p:cNvSpPr>
+          <p:nvPr>
+            <p:ph type="sldNum" sz="quarter" idx="12"/>
+          </p:nvPr>
+        </p:nvSpPr>
+        <p:spPr/>
+        <p:txBody>
+          <a:bodyPr/>
+          <a:lstStyle/>
+          <a:p>
+            <a:pPr>
+              <a:defRPr/>
+            </a:pPr>
+            <a:fld id="{FFC8DA91-1027-405E-982D-FEC1575099C3}" type="slidenum">
+              <a:rPr lang="en-US" smtClean="0"/>
+              <a:pPr>
+                <a:defRPr/>
+              </a:pPr>
+              <a:t>19</a:t>
+            </a:fld>
+            <a:endParaRPr lang="en-US"/>
+          </a:p>
+        </p:txBody>
+      </p:sp>
+    </p:spTree>
+    <p:extLst>
+      <p:ext uri="{BB962C8B-B14F-4D97-AF65-F5344CB8AC3E}">
+        <p14:creationId xmlns:p14="http://schemas.microsoft.com/office/powerpoint/2010/main" val="1637528627"/>
       </p:ext>
     </p:extLst>
   </p:cSld>
@@ -5186,7 +6753,15 @@
           <a:p>
             <a:r>
               <a:rPr lang="en-US" dirty="0" smtClean="0"/>
-              <a:t>Source code control should be extended in MIS with a low cost, effective solution</a:t>
+              <a:t>Source code control should be extended in MIS with a </a:t>
+            </a:r>
+            <a:r>
+              <a:rPr lang="en-US" dirty="0" smtClean="0"/>
+              <a:t>low-cost</a:t>
+            </a:r>
+            <a:r>
+              <a:rPr lang="en-US" dirty="0" smtClean="0"/>
+              <a:t>, effective solution</a:t>
             </a:r>
             <a:endParaRPr lang="en-US" dirty="0"/>
           </a:p>
@@ -5210,39 +6785,95 @@
         </p:spPr>
         <p:txBody>
           <a:bodyPr>
-            <a:normAutofit fontScale="85000" lnSpcReduction="20000"/>
+            <a:normAutofit/>
           </a:bodyPr>
           <a:lstStyle/>
           <a:p>
             <a:r>
               <a:rPr lang="en-US" sz="2000" dirty="0" smtClean="0"/>
-              <a:t>Current MIS source code control is managed in Perforce, in limited scale.</a:t>
-            </a:r>
-          </a:p>
-          <a:p>
+              <a:t>MIS </a:t>
+            </a:r>
             <a:r>
               <a:rPr lang="en-US" sz="2000" dirty="0" smtClean="0"/>
-              <a:t>We piggyback on what is used by R&amp;D.</a:t>
-            </a:r>
-          </a:p>
-          <a:p>
+              <a:t>source </a:t>
+            </a:r>
             <a:r>
               <a:rPr lang="en-US" sz="2000" dirty="0" smtClean="0"/>
-              <a:t>This provides MIS little capability for managing use.</a:t>
-            </a:r>
-          </a:p>
-          <a:p>
+              <a:t>code is federated across multiple systems:</a:t>
+            </a:r>
+          </a:p>
+          <a:p>
+            <a:pPr lvl="1"/>
             <a:r>
               <a:rPr lang="en-US" sz="2000" dirty="0" smtClean="0"/>
-              <a:t>Ideally, we would like to find a lightweight source code control solution that MIS can get behind.</a:t>
-            </a:r>
-          </a:p>
-          <a:p>
+              <a:t>Perforce: Sugar, </a:t>
+            </a:r>
+            <a:r>
+              <a:rPr lang="en-US" sz="2000" dirty="0" err="1" smtClean="0"/>
+              <a:t>Salesforce</a:t>
+            </a:r>
+            <a:endParaRPr lang="en-US" sz="2000" dirty="0" smtClean="0"/>
+          </a:p>
+          <a:p>
+            <a:pPr lvl="1"/>
             <a:r>
               <a:rPr lang="en-US" sz="2000" dirty="0" smtClean="0"/>
-              <a:t>… and is easy for us to use - developer and BSA alike.</a:t>
+              <a:t>Subversion: Custom </a:t>
+            </a:r>
+            <a:r>
+              <a:rPr lang="en-US" sz="2000" dirty="0" err="1" smtClean="0"/>
+              <a:t>dev</a:t>
             </a:r>
             <a:endParaRPr lang="en-US" sz="2000" dirty="0" smtClean="0"/>
+          </a:p>
+          <a:p>
+            <a:r>
+              <a:rPr lang="en-US" sz="2000" dirty="0" smtClean="0"/>
+              <a:t>Artifacts that should be version controlled aren’t</a:t>
+            </a:r>
+            <a:endParaRPr lang="en-US" sz="2000" dirty="0" smtClean="0"/>
+          </a:p>
+          <a:p>
+            <a:r>
+              <a:rPr lang="en-US" sz="2000" dirty="0"/>
+              <a:t>N</a:t>
+            </a:r>
+            <a:r>
+              <a:rPr lang="en-US" sz="2000" dirty="0" smtClean="0"/>
+              <a:t>eed </a:t>
+            </a:r>
+            <a:r>
+              <a:rPr lang="en-US" sz="2000" dirty="0" smtClean="0"/>
+              <a:t>a </a:t>
+            </a:r>
+            <a:r>
+              <a:rPr lang="en-US" sz="2000" dirty="0" smtClean="0"/>
+              <a:t>lightweight </a:t>
+            </a:r>
+            <a:r>
+              <a:rPr lang="en-US" sz="2000" dirty="0" smtClean="0"/>
+              <a:t>solution</a:t>
+            </a:r>
+            <a:endParaRPr lang="en-US" sz="2000" dirty="0" smtClean="0"/>
+          </a:p>
+          <a:p>
+            <a:pPr lvl="1"/>
+            <a:r>
+              <a:rPr lang="en-US" sz="2000" dirty="0" smtClean="0"/>
+              <a:t>…that </a:t>
+            </a:r>
+            <a:r>
+              <a:rPr lang="en-US" sz="2000" dirty="0" smtClean="0"/>
+              <a:t>is easy for us to use </a:t>
+            </a:r>
+            <a:r>
+              <a:rPr lang="en-US" sz="2000" dirty="0" smtClean="0"/>
+              <a:t>-  </a:t>
+            </a:r>
+            <a:r>
+              <a:rPr lang="en-US" sz="2000" dirty="0" smtClean="0"/>
+              <a:t>developer and BSA alike.</a:t>
+            </a:r>
           </a:p>
           <a:p>
             <a:endParaRPr lang="en-US" sz="2000" dirty="0" smtClean="0"/>
@@ -5274,6 +6905,40 @@
         </p:blipFill>
         <p:spPr/>
       </p:pic>
+      <p:sp>
+        <p:nvSpPr>
+          <p:cNvPr id="6" name="Slide Number Placeholder 3"/>
+          <p:cNvSpPr>
+            <a:spLocks noGrp="1"/>
+          </p:cNvSpPr>
+          <p:nvPr>
+            <p:ph type="sldNum" sz="quarter" idx="12"/>
+          </p:nvPr>
+        </p:nvSpPr>
+        <p:spPr>
+          <a:xfrm>
+            <a:off x="4305300" y="6356350"/>
+            <a:ext cx="533400" cy="365125"/>
+          </a:xfrm>
+        </p:spPr>
+        <p:txBody>
+          <a:bodyPr/>
+          <a:lstStyle/>
+          <a:p>
+            <a:pPr>
+              <a:defRPr/>
+            </a:pPr>
+            <a:fld id="{FFC8DA91-1027-405E-982D-FEC1575099C3}" type="slidenum">
+              <a:rPr lang="en-US" smtClean="0"/>
+              <a:pPr>
+                <a:defRPr/>
+              </a:pPr>
+              <a:t>2</a:t>
+            </a:fld>
+            <a:endParaRPr lang="en-US" dirty="0"/>
+          </a:p>
+        </p:txBody>
+      </p:sp>
     </p:spTree>
     <p:extLst>
       <p:ext uri="{BB962C8B-B14F-4D97-AF65-F5344CB8AC3E}">
@@ -5287,7 +6952,7 @@
 </p:sld>
 </file>
 
-<file path=ppt/slides/slide3.xml><?xml version="1.0" encoding="utf-8"?>
+<file path=ppt/slides/slide20.xml><?xml version="1.0" encoding="utf-8"?>
 <p:sld xmlns:a="http://schemas.openxmlformats.org/drawingml/2006/main" xmlns:r="http://schemas.openxmlformats.org/officeDocument/2006/relationships" xmlns:p="http://schemas.openxmlformats.org/presentationml/2006/main">
   <p:cSld>
     <p:spTree>
@@ -5316,14 +6981,12 @@
         </p:nvSpPr>
         <p:spPr/>
         <p:txBody>
-          <a:bodyPr>
-            <a:normAutofit fontScale="90000"/>
-          </a:bodyPr>
-          <a:lstStyle/>
-          <a:p>
-            <a:r>
-              <a:rPr lang="en-US" dirty="0" smtClean="0"/>
-              <a:t>Consider the potential benefits of formalizing code control</a:t>
+          <a:bodyPr/>
+          <a:lstStyle/>
+          <a:p>
+            <a:r>
+              <a:rPr lang="en-US" dirty="0" smtClean="0"/>
+              <a:t>Next Steps</a:t>
             </a:r>
             <a:endParaRPr lang="en-US" dirty="0"/>
           </a:p>
@@ -5341,37 +7004,102 @@
         </p:nvSpPr>
         <p:spPr>
           <a:xfrm>
-            <a:off x="457200" y="2151239"/>
-            <a:ext cx="8229600" cy="2286000"/>
+            <a:off x="739775" y="2770094"/>
+            <a:ext cx="7662864" cy="3702527"/>
           </a:xfrm>
         </p:spPr>
         <p:txBody>
           <a:bodyPr>
-            <a:normAutofit/>
+            <a:normAutofit fontScale="85000" lnSpcReduction="20000"/>
           </a:bodyPr>
           <a:lstStyle/>
           <a:p>
             <a:r>
-              <a:rPr lang="en-US" dirty="0"/>
-              <a:t>S</a:t>
-            </a:r>
-            <a:r>
-              <a:rPr lang="en-US" dirty="0" smtClean="0"/>
-              <a:t>treamline deployment process across multiple instances (example: automate deployment across non production instances to support “dot release” QA environments)</a:t>
+              <a:rPr lang="en-US" dirty="0" smtClean="0"/>
+              <a:t>Local toolset evaluation</a:t>
+            </a:r>
+          </a:p>
+          <a:p>
+            <a:r>
+              <a:rPr lang="en-US" dirty="0" err="1" smtClean="0"/>
+              <a:t>Git</a:t>
+            </a:r>
+            <a:r>
+              <a:rPr lang="en-US" dirty="0" smtClean="0"/>
+              <a:t> server vendor analysis</a:t>
+            </a:r>
+          </a:p>
+          <a:p>
+            <a:pPr lvl="1"/>
+            <a:r>
+              <a:rPr lang="en-US" dirty="0" smtClean="0"/>
+              <a:t>Cloud</a:t>
+            </a:r>
+          </a:p>
+          <a:p>
+            <a:pPr lvl="2"/>
+            <a:r>
+              <a:rPr lang="en-US" dirty="0" err="1" smtClean="0"/>
+              <a:t>Bitbucket</a:t>
+            </a:r>
+            <a:endParaRPr lang="en-US" dirty="0" smtClean="0"/>
+          </a:p>
+          <a:p>
+            <a:pPr lvl="2"/>
+            <a:r>
+              <a:rPr lang="en-US" dirty="0" err="1" smtClean="0"/>
+              <a:t>Github</a:t>
+            </a:r>
+            <a:endParaRPr lang="en-US" dirty="0" smtClean="0"/>
+          </a:p>
+          <a:p>
+            <a:pPr lvl="1"/>
+            <a:r>
+              <a:rPr lang="en-US" dirty="0" smtClean="0"/>
+              <a:t>On Premises</a:t>
+            </a:r>
+          </a:p>
+          <a:p>
+            <a:pPr lvl="2"/>
+            <a:r>
+              <a:rPr lang="en-US" dirty="0" smtClean="0"/>
+              <a:t>Stash</a:t>
+            </a:r>
+          </a:p>
+          <a:p>
+            <a:pPr lvl="2"/>
+            <a:r>
+              <a:rPr lang="en-US" dirty="0" err="1" smtClean="0"/>
+              <a:t>GitWEb</a:t>
+            </a:r>
+            <a:endParaRPr lang="en-US" dirty="0" smtClean="0"/>
+          </a:p>
+          <a:p>
+            <a:r>
+              <a:rPr lang="en-US" dirty="0" smtClean="0"/>
+              <a:t>Migrate</a:t>
+            </a:r>
+          </a:p>
+          <a:p>
+            <a:pPr lvl="1"/>
+            <a:r>
+              <a:rPr lang="en-US" dirty="0" smtClean="0"/>
+              <a:t>Start with SVN</a:t>
+            </a:r>
+          </a:p>
+          <a:p>
+            <a:pPr lvl="1"/>
+            <a:r>
+              <a:rPr lang="en-US" dirty="0" smtClean="0"/>
+              <a:t>Fold in Perforce </a:t>
             </a:r>
             <a:endParaRPr lang="en-US" dirty="0"/>
           </a:p>
-          <a:p>
-            <a:r>
-              <a:rPr lang="en-US" dirty="0" smtClean="0"/>
-              <a:t>Pull source code control capabilities into MIS at no cost beyond resource time</a:t>
-            </a:r>
-          </a:p>
-        </p:txBody>
-      </p:sp>
-      <p:sp>
-        <p:nvSpPr>
-          <p:cNvPr id="4" name="Slide Number Placeholder 3"/>
+        </p:txBody>
+      </p:sp>
+      <p:sp>
+        <p:nvSpPr>
+          <p:cNvPr id="5" name="Slide Number Placeholder 3"/>
           <p:cNvSpPr>
             <a:spLocks noGrp="1"/>
           </p:cNvSpPr>
@@ -5379,7 +7107,12 @@
             <p:ph type="sldNum" sz="quarter" idx="12"/>
           </p:nvPr>
         </p:nvSpPr>
-        <p:spPr/>
+        <p:spPr>
+          <a:xfrm>
+            <a:off x="4305300" y="6356350"/>
+            <a:ext cx="533400" cy="365125"/>
+          </a:xfrm>
+        </p:spPr>
         <p:txBody>
           <a:bodyPr/>
           <a:lstStyle/>
@@ -5392,7 +7125,97 @@
               <a:pPr>
                 <a:defRPr/>
               </a:pPr>
-              <a:t>3</a:t>
+              <a:t>20</a:t>
+            </a:fld>
+            <a:endParaRPr lang="en-US" dirty="0"/>
+          </a:p>
+        </p:txBody>
+      </p:sp>
+    </p:spTree>
+    <p:extLst>
+      <p:ext uri="{BB962C8B-B14F-4D97-AF65-F5344CB8AC3E}">
+        <p14:creationId xmlns:p14="http://schemas.microsoft.com/office/powerpoint/2010/main" val="1718253304"/>
+      </p:ext>
+    </p:extLst>
+  </p:cSld>
+  <p:clrMapOvr>
+    <a:masterClrMapping/>
+  </p:clrMapOvr>
+</p:sld>
+</file>
+
+<file path=ppt/slides/slide21.xml><?xml version="1.0" encoding="utf-8"?>
+<p:sld xmlns:a="http://schemas.openxmlformats.org/drawingml/2006/main" xmlns:r="http://schemas.openxmlformats.org/officeDocument/2006/relationships" xmlns:p="http://schemas.openxmlformats.org/presentationml/2006/main">
+  <p:cSld>
+    <p:spTree>
+      <p:nvGrpSpPr>
+        <p:cNvPr id="1" name=""/>
+        <p:cNvGrpSpPr/>
+        <p:nvPr/>
+      </p:nvGrpSpPr>
+      <p:grpSpPr>
+        <a:xfrm>
+          <a:off x="0" y="0"/>
+          <a:ext cx="0" cy="0"/>
+          <a:chOff x="0" y="0"/>
+          <a:chExt cx="0" cy="0"/>
+        </a:xfrm>
+      </p:grpSpPr>
+      <p:sp>
+        <p:nvSpPr>
+          <p:cNvPr id="2" name="Title 1"/>
+          <p:cNvSpPr>
+            <a:spLocks noGrp="1"/>
+          </p:cNvSpPr>
+          <p:nvPr>
+            <p:ph type="title"/>
+          </p:nvPr>
+        </p:nvSpPr>
+        <p:spPr/>
+        <p:txBody>
+          <a:bodyPr/>
+          <a:lstStyle/>
+          <a:p>
+            <a:r>
+              <a:rPr lang="en-US" dirty="0" smtClean="0"/>
+              <a:t>Word </a:t>
+            </a:r>
+            <a:r>
+              <a:rPr lang="en-US" dirty="0" smtClean="0"/>
+              <a:t>On The Street</a:t>
+            </a:r>
+            <a:r>
+              <a:rPr lang="en-US" dirty="0" smtClean="0"/>
+              <a:t>…</a:t>
+            </a:r>
+            <a:endParaRPr lang="en-US" dirty="0"/>
+          </a:p>
+        </p:txBody>
+      </p:sp>
+      <p:sp>
+        <p:nvSpPr>
+          <p:cNvPr id="4" name="Slide Number Placeholder 3"/>
+          <p:cNvSpPr>
+            <a:spLocks noGrp="1"/>
+          </p:cNvSpPr>
+          <p:nvPr>
+            <p:ph type="sldNum" sz="quarter" idx="12"/>
+          </p:nvPr>
+        </p:nvSpPr>
+        <p:spPr/>
+        <p:txBody>
+          <a:bodyPr/>
+          <a:lstStyle/>
+          <a:p>
+            <a:pPr>
+              <a:defRPr/>
+            </a:pPr>
+            <a:fld id="{FFC8DA91-1027-405E-982D-FEC1575099C3}" type="slidenum">
+              <a:rPr lang="en-US" smtClean="0"/>
+              <a:pPr>
+                <a:defRPr/>
+              </a:pPr>
+              <a:t>21</a:t>
             </a:fld>
             <a:endParaRPr lang="en-US"/>
           </a:p>
@@ -5414,8 +7237,8 @@
         </p:blipFill>
         <p:spPr>
           <a:xfrm>
-            <a:off x="5879758" y="4091482"/>
-            <a:ext cx="3288173" cy="2180202"/>
+            <a:off x="4343400" y="2895600"/>
+            <a:ext cx="2070100" cy="2112781"/>
           </a:xfrm>
           <a:prstGeom prst="rect">
             <a:avLst/>
@@ -5424,240 +7247,115 @@
       </p:pic>
       <p:sp>
         <p:nvSpPr>
-          <p:cNvPr id="7" name="Content Placeholder 2"/>
-          <p:cNvSpPr txBox="1">
-            <a:spLocks/>
-          </p:cNvSpPr>
+          <p:cNvPr id="6" name="Oval Callout 5"/>
+          <p:cNvSpPr/>
           <p:nvPr/>
         </p:nvSpPr>
         <p:spPr bwMode="auto">
           <a:xfrm>
-            <a:off x="457200" y="4413603"/>
-            <a:ext cx="6259689" cy="2286000"/>
+            <a:off x="1078655" y="2659119"/>
+            <a:ext cx="2987924" cy="2133600"/>
+          </a:xfrm>
+          <a:prstGeom prst="wedgeEllipseCallout">
+            <a:avLst>
+              <a:gd name="adj1" fmla="val 59668"/>
+              <a:gd name="adj2" fmla="val 21358"/>
+            </a:avLst>
+          </a:prstGeom>
+          <a:solidFill>
+            <a:schemeClr val="bg1">
+              <a:lumMod val="75000"/>
+            </a:schemeClr>
+          </a:solidFill>
+          <a:ln w="12700" cap="flat" cmpd="sng" algn="ctr">
+            <a:solidFill>
+              <a:schemeClr val="tx1"/>
+            </a:solidFill>
+            <a:prstDash val="solid"/>
+            <a:round/>
+            <a:headEnd type="none" w="med" len="med"/>
+            <a:tailEnd type="none" w="med" len="med"/>
+          </a:ln>
+          <a:effectLst/>
+        </p:spPr>
+        <p:txBody>
+          <a:bodyPr anchor="ctr"/>
+          <a:lstStyle/>
+          <a:p>
+            <a:pPr marL="0" indent="0" algn="ctr">
+              <a:buNone/>
+            </a:pPr>
+            <a:r>
+              <a:rPr lang="en-US" sz="3200" dirty="0">
+                <a:solidFill>
+                  <a:srgbClr val="0000FF"/>
+                </a:solidFill>
+                <a:latin typeface="Cooper Black"/>
+                <a:cs typeface="Cooper Black"/>
+              </a:rPr>
+              <a:t>“It</a:t>
+            </a:r>
+            <a:r>
+              <a:rPr lang="fr-FR" sz="3200" dirty="0">
+                <a:solidFill>
+                  <a:srgbClr val="0000FF"/>
+                </a:solidFill>
+                <a:latin typeface="Cooper Black"/>
+                <a:cs typeface="Cooper Black"/>
+              </a:rPr>
+              <a:t>’</a:t>
+            </a:r>
+            <a:r>
+              <a:rPr lang="en-US" sz="3200" dirty="0">
+                <a:solidFill>
+                  <a:srgbClr val="0000FF"/>
+                </a:solidFill>
+                <a:latin typeface="Cooper Black"/>
+                <a:cs typeface="Cooper Black"/>
+              </a:rPr>
+              <a:t>s actually good!”</a:t>
+            </a:r>
+          </a:p>
+        </p:txBody>
+      </p:sp>
+      <p:sp>
+        <p:nvSpPr>
+          <p:cNvPr id="8" name="TextBox 7"/>
+          <p:cNvSpPr txBox="1"/>
+          <p:nvPr/>
+        </p:nvSpPr>
+        <p:spPr>
+          <a:xfrm>
+            <a:off x="2093097" y="5029200"/>
+            <a:ext cx="5222103" cy="400110"/>
           </a:xfrm>
           <a:prstGeom prst="rect">
             <a:avLst/>
           </a:prstGeom>
+          <a:noFill/>
         </p:spPr>
         <p:txBody>
-          <a:bodyPr vert="horz" lIns="91440" tIns="45720" rIns="91440" bIns="45720" rtlCol="0">
-            <a:normAutofit fontScale="92500"/>
+          <a:bodyPr wrap="none" rtlCol="0">
+            <a:spAutoFit/>
           </a:bodyPr>
-          <a:lstStyle>
-            <a:lvl1pPr marL="342900" indent="-342900" defTabSz="914400">
-              <a:spcBef>
-                <a:spcPts val="2000"/>
-              </a:spcBef>
-              <a:buClr>
-                <a:schemeClr val="accent1"/>
-              </a:buClr>
-              <a:buSzPct val="90000"/>
-              <a:buFont typeface="Wingdings" pitchFamily="2" charset="2"/>
-              <a:buChar char="S"/>
-              <a:defRPr sz="2200">
-                <a:solidFill>
-                  <a:schemeClr val="tx1">
-                    <a:lumMod val="65000"/>
-                    <a:lumOff val="35000"/>
-                  </a:schemeClr>
-                </a:solidFill>
-              </a:defRPr>
-            </a:lvl1pPr>
-            <a:lvl2pPr marL="685800" indent="-336550" defTabSz="914400">
-              <a:spcBef>
-                <a:spcPts val="600"/>
-              </a:spcBef>
-              <a:buClr>
-                <a:schemeClr val="accent1">
-                  <a:lumMod val="60000"/>
-                  <a:lumOff val="40000"/>
-                </a:schemeClr>
-              </a:buClr>
-              <a:buSzPct val="90000"/>
-              <a:buFont typeface="Wingdings" pitchFamily="2" charset="2"/>
-              <a:buChar char="S"/>
-              <a:defRPr sz="2000">
-                <a:solidFill>
-                  <a:schemeClr val="tx1">
-                    <a:lumMod val="65000"/>
-                    <a:lumOff val="35000"/>
-                  </a:schemeClr>
-                </a:solidFill>
-              </a:defRPr>
-            </a:lvl2pPr>
-            <a:lvl3pPr marL="1035050" indent="-349250" defTabSz="914400">
-              <a:spcBef>
-                <a:spcPts val="600"/>
-              </a:spcBef>
-              <a:buClr>
-                <a:schemeClr val="accent1"/>
-              </a:buClr>
-              <a:buSzPct val="90000"/>
-              <a:buFont typeface="Wingdings" pitchFamily="2" charset="2"/>
-              <a:buChar char="S"/>
-              <a:defRPr>
-                <a:solidFill>
-                  <a:schemeClr val="tx1">
-                    <a:lumMod val="65000"/>
-                    <a:lumOff val="35000"/>
-                  </a:schemeClr>
-                </a:solidFill>
-              </a:defRPr>
-            </a:lvl3pPr>
-            <a:lvl4pPr indent="-336550" defTabSz="914400">
-              <a:spcBef>
-                <a:spcPts val="600"/>
-              </a:spcBef>
-              <a:buClr>
-                <a:schemeClr val="accent1">
-                  <a:lumMod val="60000"/>
-                  <a:lumOff val="40000"/>
-                </a:schemeClr>
-              </a:buClr>
-              <a:buSzPct val="90000"/>
-              <a:buFont typeface="Wingdings" pitchFamily="2" charset="2"/>
-              <a:buChar char="S"/>
-              <a:defRPr>
-                <a:solidFill>
-                  <a:schemeClr val="tx1">
-                    <a:lumMod val="65000"/>
-                    <a:lumOff val="35000"/>
-                  </a:schemeClr>
-                </a:solidFill>
-              </a:defRPr>
-            </a:lvl4pPr>
-            <a:lvl5pPr marL="1720850" indent="-349250" defTabSz="914400">
-              <a:spcBef>
-                <a:spcPts val="600"/>
-              </a:spcBef>
-              <a:buClr>
-                <a:schemeClr val="accent1"/>
-              </a:buClr>
-              <a:buSzPct val="90000"/>
-              <a:buFont typeface="Wingdings" pitchFamily="2" charset="2"/>
-              <a:buChar char="S"/>
-              <a:defRPr>
-                <a:solidFill>
-                  <a:schemeClr val="tx1">
-                    <a:lumMod val="65000"/>
-                    <a:lumOff val="35000"/>
-                  </a:schemeClr>
-                </a:solidFill>
-              </a:defRPr>
-            </a:lvl5pPr>
-            <a:lvl6pPr marL="2055813" indent="-344488" defTabSz="914400">
-              <a:spcBef>
-                <a:spcPct val="20000"/>
-              </a:spcBef>
-              <a:buClr>
-                <a:schemeClr val="accent1">
-                  <a:lumMod val="60000"/>
-                  <a:lumOff val="40000"/>
-                </a:schemeClr>
-              </a:buClr>
-              <a:buSzPct val="90000"/>
-              <a:buFont typeface="Wingdings" pitchFamily="2" charset="2"/>
-              <a:buChar char=""/>
-              <a:defRPr lang="en-US" dirty="0" smtClean="0">
-                <a:solidFill>
-                  <a:schemeClr val="tx1">
-                    <a:lumMod val="65000"/>
-                    <a:lumOff val="35000"/>
-                  </a:schemeClr>
-                </a:solidFill>
-              </a:defRPr>
-            </a:lvl6pPr>
-            <a:lvl7pPr marL="2398713" indent="-344488" defTabSz="914400">
-              <a:spcBef>
-                <a:spcPct val="20000"/>
-              </a:spcBef>
-              <a:buClr>
-                <a:schemeClr val="accent1"/>
-              </a:buClr>
-              <a:buSzPct val="90000"/>
-              <a:buFont typeface="Wingdings" pitchFamily="2" charset="2"/>
-              <a:buChar char=""/>
-              <a:defRPr lang="en-US" dirty="0" smtClean="0">
-                <a:solidFill>
-                  <a:schemeClr val="tx1">
-                    <a:lumMod val="65000"/>
-                    <a:lumOff val="35000"/>
-                  </a:schemeClr>
-                </a:solidFill>
-              </a:defRPr>
-            </a:lvl7pPr>
-            <a:lvl8pPr marL="2743200" indent="-344488" defTabSz="914400">
-              <a:spcBef>
-                <a:spcPct val="20000"/>
-              </a:spcBef>
-              <a:buClr>
-                <a:schemeClr val="accent1">
-                  <a:lumMod val="60000"/>
-                  <a:lumOff val="40000"/>
-                </a:schemeClr>
-              </a:buClr>
-              <a:buSzPct val="90000"/>
-              <a:buFont typeface="Wingdings" pitchFamily="2" charset="2"/>
-              <a:buChar char=""/>
-              <a:defRPr lang="en-US" dirty="0" smtClean="0">
-                <a:solidFill>
-                  <a:schemeClr val="tx1">
-                    <a:lumMod val="65000"/>
-                    <a:lumOff val="35000"/>
-                  </a:schemeClr>
-                </a:solidFill>
-              </a:defRPr>
-            </a:lvl8pPr>
-            <a:lvl9pPr marL="3087688" indent="-344488" defTabSz="914400">
-              <a:spcBef>
-                <a:spcPct val="20000"/>
-              </a:spcBef>
-              <a:buClr>
-                <a:schemeClr val="accent1"/>
-              </a:buClr>
-              <a:buSzPct val="90000"/>
-              <a:buFont typeface="Wingdings" pitchFamily="2" charset="2"/>
-              <a:buChar char=""/>
-              <a:defRPr lang="en-US" dirty="0">
-                <a:solidFill>
-                  <a:schemeClr val="tx1">
-                    <a:lumMod val="65000"/>
-                    <a:lumOff val="35000"/>
-                  </a:schemeClr>
-                </a:solidFill>
-              </a:defRPr>
-            </a:lvl9pPr>
-          </a:lstStyle>
-          <a:p>
-            <a:r>
-              <a:rPr lang="en-US" dirty="0"/>
-              <a:t>Extend source code control across MIS platforms</a:t>
-            </a:r>
-          </a:p>
-          <a:p>
-            <a:r>
-              <a:rPr lang="en-US" dirty="0"/>
-              <a:t>Allows for easier restores if necessary</a:t>
-            </a:r>
-          </a:p>
-          <a:p>
-            <a:r>
-              <a:rPr lang="en-US" dirty="0"/>
-              <a:t>Simplifies multi-user development</a:t>
-            </a:r>
-          </a:p>
-          <a:p>
-            <a:r>
-              <a:rPr lang="en-US" dirty="0"/>
-              <a:t>Easily maintain different versions of an application</a:t>
-            </a:r>
+          <a:lstStyle/>
+          <a:p>
+            <a:r>
+              <a:rPr lang="en-US" sz="2000" dirty="0" smtClean="0"/>
+              <a:t>- As stated on 5/21 in regards to </a:t>
+            </a:r>
+            <a:r>
+              <a:rPr lang="en-US" sz="2000" dirty="0" err="1" smtClean="0"/>
+              <a:t>SourceTree</a:t>
+            </a:r>
+            <a:endParaRPr lang="en-US" sz="2000" dirty="0"/>
           </a:p>
         </p:txBody>
       </p:sp>
     </p:spTree>
     <p:extLst>
       <p:ext uri="{BB962C8B-B14F-4D97-AF65-F5344CB8AC3E}">
-        <p14:creationId xmlns:p14="http://schemas.microsoft.com/office/powerpoint/2010/main" val="425316312"/>
+        <p14:creationId xmlns:p14="http://schemas.microsoft.com/office/powerpoint/2010/main" val="2559135229"/>
       </p:ext>
     </p:extLst>
   </p:cSld>
@@ -5667,446 +7365,7 @@
 </p:sld>
 </file>
 
-<file path=ppt/slides/slide4.xml><?xml version="1.0" encoding="utf-8"?>
-<p:sld xmlns:a="http://schemas.openxmlformats.org/drawingml/2006/main" xmlns:r="http://schemas.openxmlformats.org/officeDocument/2006/relationships" xmlns:p="http://schemas.openxmlformats.org/presentationml/2006/main">
-  <p:cSld>
-    <p:spTree>
-      <p:nvGrpSpPr>
-        <p:cNvPr id="1" name=""/>
-        <p:cNvGrpSpPr/>
-        <p:nvPr/>
-      </p:nvGrpSpPr>
-      <p:grpSpPr>
-        <a:xfrm>
-          <a:off x="0" y="0"/>
-          <a:ext cx="0" cy="0"/>
-          <a:chOff x="0" y="0"/>
-          <a:chExt cx="0" cy="0"/>
-        </a:xfrm>
-      </p:grpSpPr>
-      <p:sp>
-        <p:nvSpPr>
-          <p:cNvPr id="2" name="Title 1"/>
-          <p:cNvSpPr>
-            <a:spLocks noGrp="1"/>
-          </p:cNvSpPr>
-          <p:nvPr>
-            <p:ph type="title"/>
-          </p:nvPr>
-        </p:nvSpPr>
-        <p:spPr/>
-        <p:txBody>
-          <a:bodyPr>
-            <a:normAutofit fontScale="90000"/>
-          </a:bodyPr>
-          <a:lstStyle/>
-          <a:p>
-            <a:r>
-              <a:rPr lang="en-US" dirty="0" smtClean="0"/>
-              <a:t>Several factors in the solution lend itself to a suitable MIS approach</a:t>
-            </a:r>
-            <a:endParaRPr lang="en-US" dirty="0"/>
-          </a:p>
-        </p:txBody>
-      </p:sp>
-      <p:sp>
-        <p:nvSpPr>
-          <p:cNvPr id="3" name="Content Placeholder 2"/>
-          <p:cNvSpPr>
-            <a:spLocks noGrp="1"/>
-          </p:cNvSpPr>
-          <p:nvPr>
-            <p:ph idx="1"/>
-          </p:nvPr>
-        </p:nvSpPr>
-        <p:spPr>
-          <a:xfrm>
-            <a:off x="228600" y="1920875"/>
-            <a:ext cx="8686800" cy="4800600"/>
-          </a:xfrm>
-        </p:spPr>
-        <p:txBody>
-          <a:bodyPr>
-            <a:normAutofit fontScale="70000" lnSpcReduction="20000"/>
-          </a:bodyPr>
-          <a:lstStyle/>
-          <a:p>
-            <a:r>
-              <a:rPr lang="en-US" dirty="0" err="1" smtClean="0"/>
-              <a:t>Git</a:t>
-            </a:r>
-            <a:r>
-              <a:rPr lang="en-US" dirty="0" smtClean="0"/>
-              <a:t> provides a free, competent solution to manage source code</a:t>
-            </a:r>
-          </a:p>
-          <a:p>
-            <a:r>
-              <a:rPr lang="en-US" dirty="0" smtClean="0"/>
-              <a:t>Everything’s worked </a:t>
-            </a:r>
-            <a:r>
-              <a:rPr lang="en-US" dirty="0"/>
-              <a:t>on </a:t>
-            </a:r>
-            <a:r>
-              <a:rPr lang="en-US" dirty="0" smtClean="0"/>
-              <a:t>local machine; a 2-step process is used </a:t>
-            </a:r>
-            <a:r>
-              <a:rPr lang="en-US" dirty="0"/>
-              <a:t>to commit</a:t>
-            </a:r>
-          </a:p>
-          <a:p>
-            <a:pPr lvl="2"/>
-            <a:r>
-              <a:rPr lang="en-US" dirty="0"/>
-              <a:t>Commit to master locally</a:t>
-            </a:r>
-          </a:p>
-          <a:p>
-            <a:pPr lvl="2"/>
-            <a:r>
-              <a:rPr lang="en-US" dirty="0"/>
-              <a:t>Then commit local master to server master</a:t>
-            </a:r>
-          </a:p>
-          <a:p>
-            <a:r>
-              <a:rPr lang="en-US" dirty="0" smtClean="0"/>
-              <a:t>Exclusive locks do not happen</a:t>
-            </a:r>
-          </a:p>
-          <a:p>
-            <a:r>
-              <a:rPr lang="en-US" dirty="0" smtClean="0"/>
-              <a:t>Different governance schemes can be applied to control master version</a:t>
-            </a:r>
-          </a:p>
-          <a:p>
-            <a:pPr lvl="1"/>
-            <a:r>
-              <a:rPr lang="en-US" dirty="0" smtClean="0"/>
-              <a:t>Free for all</a:t>
-            </a:r>
-          </a:p>
-          <a:p>
-            <a:pPr lvl="1"/>
-            <a:r>
-              <a:rPr lang="en-US" dirty="0" smtClean="0"/>
-              <a:t>Gate </a:t>
-            </a:r>
-            <a:r>
-              <a:rPr lang="en-US" dirty="0"/>
-              <a:t>keeper for </a:t>
-            </a:r>
-            <a:r>
-              <a:rPr lang="en-US" dirty="0" smtClean="0"/>
-              <a:t>master</a:t>
-            </a:r>
-          </a:p>
-          <a:p>
-            <a:pPr lvl="1"/>
-            <a:r>
-              <a:rPr lang="en-US" dirty="0" smtClean="0"/>
-              <a:t>Lieutenant and Governors (multiple people responsible for various modules)</a:t>
-            </a:r>
-          </a:p>
-          <a:p>
-            <a:r>
-              <a:rPr lang="en-US" dirty="0" smtClean="0"/>
-              <a:t>Tagging can be implemented to create specific deployment files</a:t>
-            </a:r>
-          </a:p>
-          <a:p>
-            <a:r>
-              <a:rPr lang="en-US" dirty="0" smtClean="0"/>
-              <a:t>Branching allows different developers to work on different parts of code and allows users to reconcile difference upon committing update. Branches could be setup as:</a:t>
-            </a:r>
-            <a:endParaRPr lang="en-US" dirty="0"/>
-          </a:p>
-          <a:p>
-            <a:pPr lvl="3"/>
-            <a:r>
-              <a:rPr lang="en-US" dirty="0" smtClean="0"/>
-              <a:t>Versions</a:t>
-            </a:r>
-            <a:endParaRPr lang="en-US" dirty="0"/>
-          </a:p>
-          <a:p>
-            <a:pPr lvl="3"/>
-            <a:r>
-              <a:rPr lang="en-US" dirty="0"/>
-              <a:t>Instances (</a:t>
-            </a:r>
-            <a:r>
-              <a:rPr lang="en-US" dirty="0" err="1"/>
-              <a:t>dev</a:t>
-            </a:r>
-            <a:r>
-              <a:rPr lang="en-US" dirty="0"/>
-              <a:t>, test, prod)</a:t>
-            </a:r>
-          </a:p>
-          <a:p>
-            <a:pPr lvl="3"/>
-            <a:r>
-              <a:rPr lang="en-US" dirty="0"/>
-              <a:t>No right answer, depends on what works best for team</a:t>
-            </a:r>
-          </a:p>
-          <a:p>
-            <a:pPr lvl="1"/>
-            <a:endParaRPr lang="en-US" dirty="0"/>
-          </a:p>
-          <a:p>
-            <a:endParaRPr lang="en-US" dirty="0"/>
-          </a:p>
-        </p:txBody>
-      </p:sp>
-      <p:sp>
-        <p:nvSpPr>
-          <p:cNvPr id="4" name="Slide Number Placeholder 3"/>
-          <p:cNvSpPr>
-            <a:spLocks noGrp="1"/>
-          </p:cNvSpPr>
-          <p:nvPr>
-            <p:ph type="sldNum" sz="quarter" idx="12"/>
-          </p:nvPr>
-        </p:nvSpPr>
-        <p:spPr/>
-        <p:txBody>
-          <a:bodyPr/>
-          <a:lstStyle/>
-          <a:p>
-            <a:pPr>
-              <a:defRPr/>
-            </a:pPr>
-            <a:fld id="{FFC8DA91-1027-405E-982D-FEC1575099C3}" type="slidenum">
-              <a:rPr lang="en-US" smtClean="0"/>
-              <a:pPr>
-                <a:defRPr/>
-              </a:pPr>
-              <a:t>4</a:t>
-            </a:fld>
-            <a:endParaRPr lang="en-US"/>
-          </a:p>
-        </p:txBody>
-      </p:sp>
-    </p:spTree>
-    <p:extLst>
-      <p:ext uri="{BB962C8B-B14F-4D97-AF65-F5344CB8AC3E}">
-        <p14:creationId xmlns:p14="http://schemas.microsoft.com/office/powerpoint/2010/main" val="2588257310"/>
-      </p:ext>
-    </p:extLst>
-  </p:cSld>
-  <p:clrMapOvr>
-    <a:masterClrMapping/>
-  </p:clrMapOvr>
-</p:sld>
-</file>
-
-<file path=ppt/slides/slide5.xml><?xml version="1.0" encoding="utf-8"?>
-<p:sld xmlns:a="http://schemas.openxmlformats.org/drawingml/2006/main" xmlns:r="http://schemas.openxmlformats.org/officeDocument/2006/relationships" xmlns:p="http://schemas.openxmlformats.org/presentationml/2006/main">
-  <p:cSld>
-    <p:spTree>
-      <p:nvGrpSpPr>
-        <p:cNvPr id="1" name=""/>
-        <p:cNvGrpSpPr/>
-        <p:nvPr/>
-      </p:nvGrpSpPr>
-      <p:grpSpPr>
-        <a:xfrm>
-          <a:off x="0" y="0"/>
-          <a:ext cx="0" cy="0"/>
-          <a:chOff x="0" y="0"/>
-          <a:chExt cx="0" cy="0"/>
-        </a:xfrm>
-      </p:grpSpPr>
-      <p:sp>
-        <p:nvSpPr>
-          <p:cNvPr id="2" name="Title 1"/>
-          <p:cNvSpPr>
-            <a:spLocks noGrp="1"/>
-          </p:cNvSpPr>
-          <p:nvPr>
-            <p:ph type="title"/>
-          </p:nvPr>
-        </p:nvSpPr>
-        <p:spPr/>
-        <p:txBody>
-          <a:bodyPr/>
-          <a:lstStyle/>
-          <a:p>
-            <a:r>
-              <a:rPr lang="en-US" dirty="0" smtClean="0"/>
-              <a:t>To the layperson…</a:t>
-            </a:r>
-            <a:endParaRPr lang="en-US" dirty="0"/>
-          </a:p>
-        </p:txBody>
-      </p:sp>
-      <p:sp>
-        <p:nvSpPr>
-          <p:cNvPr id="3" name="Content Placeholder 2"/>
-          <p:cNvSpPr>
-            <a:spLocks noGrp="1"/>
-          </p:cNvSpPr>
-          <p:nvPr>
-            <p:ph idx="1"/>
-          </p:nvPr>
-        </p:nvSpPr>
-        <p:spPr/>
-        <p:txBody>
-          <a:bodyPr>
-            <a:normAutofit fontScale="85000" lnSpcReduction="20000"/>
-          </a:bodyPr>
-          <a:lstStyle/>
-          <a:p>
-            <a:pPr marL="0" indent="0">
-              <a:buNone/>
-            </a:pPr>
-            <a:r>
-              <a:rPr lang="en-US" dirty="0" smtClean="0"/>
-              <a:t>“In </a:t>
-            </a:r>
-            <a:r>
-              <a:rPr lang="en-US" dirty="0"/>
-              <a:t>software development, </a:t>
-            </a:r>
-            <a:r>
-              <a:rPr lang="en-US" dirty="0" err="1"/>
-              <a:t>Git</a:t>
-            </a:r>
-            <a:r>
-              <a:rPr lang="en-US" dirty="0"/>
-              <a:t> /</a:t>
-            </a:r>
-            <a:r>
-              <a:rPr lang="en-US" dirty="0" err="1"/>
-              <a:t>ɡɪt</a:t>
-            </a:r>
-            <a:r>
-              <a:rPr lang="en-US" dirty="0"/>
-              <a:t>/ is a distributed revision control and source code management (SCM) system with an emphasis on speed.[4] </a:t>
-            </a:r>
-            <a:r>
-              <a:rPr lang="en-US" dirty="0" err="1"/>
-              <a:t>Git</a:t>
-            </a:r>
-            <a:r>
-              <a:rPr lang="en-US" dirty="0"/>
-              <a:t> was initially designed and developed by Linus Torvalds for Linux kernel development in 2005</a:t>
-            </a:r>
-            <a:r>
-              <a:rPr lang="en-US" dirty="0" smtClean="0"/>
-              <a:t>.</a:t>
-            </a:r>
-          </a:p>
-          <a:p>
-            <a:pPr marL="0" indent="0">
-              <a:buNone/>
-            </a:pPr>
-            <a:r>
-              <a:rPr lang="en-US" dirty="0"/>
-              <a:t>Every </a:t>
-            </a:r>
-            <a:r>
-              <a:rPr lang="en-US" dirty="0" err="1"/>
-              <a:t>Git</a:t>
-            </a:r>
-            <a:r>
-              <a:rPr lang="en-US" dirty="0"/>
-              <a:t> working directory is a full-fledged repository with complete history and full version tracking capabilities, not dependent on network access or a central server</a:t>
-            </a:r>
-            <a:r>
-              <a:rPr lang="en-US" dirty="0" smtClean="0"/>
-              <a:t>.</a:t>
-            </a:r>
-          </a:p>
-          <a:p>
-            <a:pPr marL="0" indent="0">
-              <a:buNone/>
-            </a:pPr>
-            <a:r>
-              <a:rPr lang="en-US" dirty="0" err="1"/>
-              <a:t>Git</a:t>
-            </a:r>
-            <a:r>
-              <a:rPr lang="en-US" dirty="0"/>
-              <a:t> is free software distributed under the terms of the GNU General Public License version 2</a:t>
-            </a:r>
-            <a:r>
-              <a:rPr lang="en-US" dirty="0" smtClean="0"/>
-              <a:t>.”</a:t>
-            </a:r>
-          </a:p>
-          <a:p>
-            <a:pPr marL="0" indent="0">
-              <a:buNone/>
-            </a:pPr>
-            <a:r>
-              <a:rPr lang="en-US" dirty="0"/>
-              <a:t>- Wikipedia (</a:t>
-            </a:r>
-            <a:r>
-              <a:rPr lang="en-US" dirty="0">
-                <a:hlinkClick r:id="rId2"/>
-              </a:rPr>
-              <a:t>http://en.wikipedia.org/wiki/Git_(software</a:t>
-            </a:r>
-            <a:r>
-              <a:rPr lang="en-US" dirty="0" smtClean="0"/>
-              <a:t>)) </a:t>
-            </a:r>
-            <a:endParaRPr lang="en-US" dirty="0"/>
-          </a:p>
-        </p:txBody>
-      </p:sp>
-      <p:sp>
-        <p:nvSpPr>
-          <p:cNvPr id="4" name="Slide Number Placeholder 3"/>
-          <p:cNvSpPr>
-            <a:spLocks noGrp="1"/>
-          </p:cNvSpPr>
-          <p:nvPr>
-            <p:ph type="sldNum" sz="quarter" idx="12"/>
-          </p:nvPr>
-        </p:nvSpPr>
-        <p:spPr/>
-        <p:txBody>
-          <a:bodyPr/>
-          <a:lstStyle/>
-          <a:p>
-            <a:pPr>
-              <a:defRPr/>
-            </a:pPr>
-            <a:fld id="{FFC8DA91-1027-405E-982D-FEC1575099C3}" type="slidenum">
-              <a:rPr lang="en-US" smtClean="0"/>
-              <a:pPr>
-                <a:defRPr/>
-              </a:pPr>
-              <a:t>5</a:t>
-            </a:fld>
-            <a:endParaRPr lang="en-US"/>
-          </a:p>
-        </p:txBody>
-      </p:sp>
-    </p:spTree>
-    <p:extLst>
-      <p:ext uri="{BB962C8B-B14F-4D97-AF65-F5344CB8AC3E}">
-        <p14:creationId xmlns:p14="http://schemas.microsoft.com/office/powerpoint/2010/main" val="3465155390"/>
-      </p:ext>
-    </p:extLst>
-  </p:cSld>
-  <p:clrMapOvr>
-    <a:masterClrMapping/>
-  </p:clrMapOvr>
-</p:sld>
-</file>
-
-<file path=ppt/slides/slide6.xml><?xml version="1.0" encoding="utf-8"?>
+<file path=ppt/slides/slide22.xml><?xml version="1.0" encoding="utf-8"?>
 <p:sld xmlns:a="http://schemas.openxmlformats.org/drawingml/2006/main" xmlns:r="http://schemas.openxmlformats.org/officeDocument/2006/relationships" xmlns:p="http://schemas.openxmlformats.org/presentationml/2006/main">
   <p:cSld>
     <p:spTree>
@@ -6171,7 +7430,7 @@
           <a:p>
             <a:r>
               <a:rPr lang="en-US" dirty="0" smtClean="0"/>
-              <a:t>Free tools are available to setup distributed source code control environment </a:t>
+              <a:t>Toolset</a:t>
             </a:r>
             <a:endParaRPr lang="en-US" dirty="0"/>
           </a:p>
@@ -6189,7 +7448,7 @@
         </p:nvSpPr>
         <p:spPr>
           <a:xfrm>
-            <a:off x="115460" y="2011324"/>
+            <a:off x="115460" y="2493069"/>
             <a:ext cx="8876139" cy="3267169"/>
           </a:xfrm>
         </p:spPr>
@@ -6287,17 +7546,29 @@
             </a:r>
             <a:r>
               <a:rPr lang="en-US" sz="1600" dirty="0" err="1" smtClean="0"/>
-              <a:t>git</a:t>
+              <a:t>github</a:t>
             </a:r>
             <a:r>
               <a:rPr lang="en-US" sz="1600" dirty="0" smtClean="0"/>
-              <a:t> hub account</a:t>
-            </a:r>
-          </a:p>
-          <a:p>
+              <a:t> </a:t>
+            </a:r>
             <a:r>
               <a:rPr lang="en-US" sz="1600" dirty="0" smtClean="0"/>
-              <a:t>Setup “UI Wrapper”, an application that facilitates </a:t>
+              <a:t>account</a:t>
+            </a:r>
+          </a:p>
+          <a:p>
+            <a:r>
+              <a:rPr lang="en-US" sz="1600" dirty="0" err="1" smtClean="0"/>
+              <a:t>Git</a:t>
+            </a:r>
+            <a:r>
+              <a:rPr lang="en-US" sz="1600" dirty="0" smtClean="0"/>
+              <a:t> client, </a:t>
+            </a:r>
+            <a:r>
+              <a:rPr lang="en-US" sz="1600" dirty="0" smtClean="0"/>
+              <a:t>an application that facilitates </a:t>
             </a:r>
             <a:r>
               <a:rPr lang="en-US" sz="1600" dirty="0" err="1" smtClean="0"/>
@@ -6346,54 +7617,769 @@
             </a:r>
           </a:p>
           <a:p>
+            <a:pPr lvl="1"/>
+            <a:endParaRPr lang="en-US" sz="1600" dirty="0" smtClean="0"/>
+          </a:p>
+          <a:p>
+            <a:pPr lvl="1"/>
+            <a:endParaRPr lang="en-US" sz="1600" dirty="0" smtClean="0"/>
+          </a:p>
+          <a:p>
+            <a:endParaRPr lang="en-US" sz="1600" dirty="0" smtClean="0"/>
+          </a:p>
+          <a:p>
+            <a:endParaRPr lang="en-US" sz="1600" dirty="0"/>
+          </a:p>
+        </p:txBody>
+      </p:sp>
+      <p:sp>
+        <p:nvSpPr>
+          <p:cNvPr id="4" name="Slide Number Placeholder 3"/>
+          <p:cNvSpPr>
+            <a:spLocks noGrp="1"/>
+          </p:cNvSpPr>
+          <p:nvPr>
+            <p:ph type="sldNum" sz="quarter" idx="12"/>
+          </p:nvPr>
+        </p:nvSpPr>
+        <p:spPr/>
+        <p:txBody>
+          <a:bodyPr/>
+          <a:lstStyle/>
+          <a:p>
+            <a:pPr>
+              <a:defRPr/>
+            </a:pPr>
+            <a:fld id="{FFC8DA91-1027-405E-982D-FEC1575099C3}" type="slidenum">
+              <a:rPr lang="en-US" smtClean="0"/>
+              <a:pPr>
+                <a:defRPr/>
+              </a:pPr>
+              <a:t>22</a:t>
+            </a:fld>
+            <a:endParaRPr lang="en-US" dirty="0"/>
+          </a:p>
+        </p:txBody>
+      </p:sp>
+    </p:spTree>
+    <p:extLst>
+      <p:ext uri="{BB962C8B-B14F-4D97-AF65-F5344CB8AC3E}">
+        <p14:creationId xmlns:p14="http://schemas.microsoft.com/office/powerpoint/2010/main" val="73462699"/>
+      </p:ext>
+    </p:extLst>
+  </p:cSld>
+  <p:clrMapOvr>
+    <a:masterClrMapping/>
+  </p:clrMapOvr>
+</p:sld>
+</file>
+
+<file path=ppt/slides/slide23.xml><?xml version="1.0" encoding="utf-8"?>
+<p:sld xmlns:a="http://schemas.openxmlformats.org/drawingml/2006/main" xmlns:r="http://schemas.openxmlformats.org/officeDocument/2006/relationships" xmlns:p="http://schemas.openxmlformats.org/presentationml/2006/main">
+  <p:cSld>
+    <p:spTree>
+      <p:nvGrpSpPr>
+        <p:cNvPr id="1" name=""/>
+        <p:cNvGrpSpPr/>
+        <p:nvPr/>
+      </p:nvGrpSpPr>
+      <p:grpSpPr>
+        <a:xfrm>
+          <a:off x="0" y="0"/>
+          <a:ext cx="0" cy="0"/>
+          <a:chOff x="0" y="0"/>
+          <a:chExt cx="0" cy="0"/>
+        </a:xfrm>
+      </p:grpSpPr>
+      <p:sp>
+        <p:nvSpPr>
+          <p:cNvPr id="2" name="Title 1"/>
+          <p:cNvSpPr>
+            <a:spLocks noGrp="1"/>
+          </p:cNvSpPr>
+          <p:nvPr>
+            <p:ph type="title"/>
+          </p:nvPr>
+        </p:nvSpPr>
+        <p:spPr>
+          <a:xfrm>
+            <a:off x="1545396" y="679525"/>
+            <a:ext cx="6324600" cy="685800"/>
+          </a:xfrm>
+        </p:spPr>
+        <p:txBody>
+          <a:bodyPr>
+            <a:normAutofit fontScale="90000"/>
+          </a:bodyPr>
+          <a:lstStyle/>
+          <a:p>
+            <a:r>
+              <a:rPr lang="en-US" dirty="0" smtClean="0"/>
+              <a:t>Resources</a:t>
+            </a:r>
+            <a:endParaRPr lang="en-US" dirty="0"/>
+          </a:p>
+        </p:txBody>
+      </p:sp>
+      <p:sp>
+        <p:nvSpPr>
+          <p:cNvPr id="3" name="Content Placeholder 2"/>
+          <p:cNvSpPr>
+            <a:spLocks noGrp="1"/>
+          </p:cNvSpPr>
+          <p:nvPr>
+            <p:ph idx="1"/>
+          </p:nvPr>
+        </p:nvSpPr>
+        <p:spPr>
+          <a:xfrm>
+            <a:off x="115460" y="2440515"/>
+            <a:ext cx="8876139" cy="3267169"/>
+          </a:xfrm>
+        </p:spPr>
+        <p:txBody>
+          <a:bodyPr>
+            <a:noAutofit/>
+          </a:bodyPr>
+          <a:lstStyle/>
+          <a:p>
             <a:r>
               <a:rPr lang="en-US" sz="1600" dirty="0" smtClean="0"/>
-              <a:t>For more help, refer to online references such as</a:t>
+              <a:t>Overview:</a:t>
             </a:r>
           </a:p>
           <a:p>
             <a:pPr lvl="1"/>
             <a:r>
-              <a:rPr lang="en-US" sz="1600" dirty="0">
-                <a:hlinkClick r:id="rId6"/>
+              <a:rPr lang="en-US" sz="1400" dirty="0">
+                <a:hlinkClick r:id="rId2"/>
+              </a:rPr>
+              <a:t>http://www.slideshare.net/svenpeters/getting-git-right</a:t>
+            </a:r>
+            <a:endParaRPr lang="en-US" sz="1400" dirty="0"/>
+          </a:p>
+          <a:p>
+            <a:pPr lvl="1"/>
+            <a:r>
+              <a:rPr lang="en-US" sz="1400" dirty="0">
+                <a:hlinkClick r:id="rId3"/>
+              </a:rPr>
+              <a:t>http://git-scm.com/about/</a:t>
+            </a:r>
+            <a:endParaRPr lang="en-US" sz="1400" dirty="0"/>
+          </a:p>
+          <a:p>
+            <a:pPr lvl="1"/>
+            <a:endParaRPr lang="en-US" sz="1400" dirty="0" smtClean="0"/>
+          </a:p>
+          <a:p>
+            <a:r>
+              <a:rPr lang="en-US" sz="1600" dirty="0" smtClean="0"/>
+              <a:t>Details:</a:t>
+            </a:r>
+          </a:p>
+          <a:p>
+            <a:pPr lvl="1"/>
+            <a:r>
+              <a:rPr lang="en-US" sz="1400" dirty="0">
+                <a:hlinkClick r:id="rId4"/>
               </a:rPr>
               <a:t>http://git-scm.com/book</a:t>
             </a:r>
+            <a:endParaRPr lang="en-US" sz="1400" dirty="0"/>
+          </a:p>
+          <a:p>
+            <a:pPr lvl="1"/>
+            <a:r>
+              <a:rPr lang="en-US" sz="1400" dirty="0">
+                <a:hlinkClick r:id="rId5"/>
+              </a:rPr>
+              <a:t>https://www.atlassian.com/git/tutorial/git-</a:t>
+            </a:r>
+            <a:r>
+              <a:rPr lang="en-US" sz="1400" dirty="0" smtClean="0">
+                <a:hlinkClick r:id="rId5"/>
+              </a:rPr>
+              <a:t>basics</a:t>
+            </a:r>
+            <a:endParaRPr lang="en-US" sz="1600" dirty="0" smtClean="0"/>
+          </a:p>
+          <a:p>
             <a:endParaRPr lang="en-US" sz="1600" dirty="0"/>
           </a:p>
+        </p:txBody>
+      </p:sp>
+      <p:sp>
+        <p:nvSpPr>
+          <p:cNvPr id="4" name="Slide Number Placeholder 3"/>
+          <p:cNvSpPr>
+            <a:spLocks noGrp="1"/>
+          </p:cNvSpPr>
+          <p:nvPr>
+            <p:ph type="sldNum" sz="quarter" idx="12"/>
+          </p:nvPr>
+        </p:nvSpPr>
+        <p:spPr/>
+        <p:txBody>
+          <a:bodyPr/>
+          <a:lstStyle/>
+          <a:p>
+            <a:pPr>
+              <a:defRPr/>
+            </a:pPr>
+            <a:fld id="{FFC8DA91-1027-405E-982D-FEC1575099C3}" type="slidenum">
+              <a:rPr lang="en-US" smtClean="0"/>
+              <a:pPr>
+                <a:defRPr/>
+              </a:pPr>
+              <a:t>23</a:t>
+            </a:fld>
+            <a:endParaRPr lang="en-US" dirty="0"/>
+          </a:p>
+        </p:txBody>
+      </p:sp>
+    </p:spTree>
+    <p:extLst>
+      <p:ext uri="{BB962C8B-B14F-4D97-AF65-F5344CB8AC3E}">
+        <p14:creationId xmlns:p14="http://schemas.microsoft.com/office/powerpoint/2010/main" val="1529115142"/>
+      </p:ext>
+    </p:extLst>
+  </p:cSld>
+  <p:clrMapOvr>
+    <a:masterClrMapping/>
+  </p:clrMapOvr>
+</p:sld>
+</file>
+
+<file path=ppt/slides/slide3.xml><?xml version="1.0" encoding="utf-8"?>
+<p:sld xmlns:a="http://schemas.openxmlformats.org/drawingml/2006/main" xmlns:r="http://schemas.openxmlformats.org/officeDocument/2006/relationships" xmlns:p="http://schemas.openxmlformats.org/presentationml/2006/main">
+  <p:cSld>
+    <p:spTree>
+      <p:nvGrpSpPr>
+        <p:cNvPr id="1" name=""/>
+        <p:cNvGrpSpPr/>
+        <p:nvPr/>
+      </p:nvGrpSpPr>
+      <p:grpSpPr>
+        <a:xfrm>
+          <a:off x="0" y="0"/>
+          <a:ext cx="0" cy="0"/>
+          <a:chOff x="0" y="0"/>
+          <a:chExt cx="0" cy="0"/>
+        </a:xfrm>
+      </p:grpSpPr>
+      <p:pic>
+        <p:nvPicPr>
+          <p:cNvPr id="5" name="Picture 4"/>
+          <p:cNvPicPr>
+            <a:picLocks noChangeAspect="1"/>
+          </p:cNvPicPr>
+          <p:nvPr/>
+        </p:nvPicPr>
+        <p:blipFill>
+          <a:blip r:embed="rId2"/>
+          <a:stretch>
+            <a:fillRect/>
+          </a:stretch>
+        </p:blipFill>
+        <p:spPr>
+          <a:xfrm>
+            <a:off x="5827204" y="3723604"/>
+            <a:ext cx="3288173" cy="2180202"/>
+          </a:xfrm>
+          <a:prstGeom prst="rect">
+            <a:avLst/>
+          </a:prstGeom>
+        </p:spPr>
+      </p:pic>
+      <p:sp>
+        <p:nvSpPr>
+          <p:cNvPr id="2" name="Title 1"/>
+          <p:cNvSpPr>
+            <a:spLocks noGrp="1"/>
+          </p:cNvSpPr>
+          <p:nvPr>
+            <p:ph type="title"/>
+          </p:nvPr>
+        </p:nvSpPr>
+        <p:spPr/>
+        <p:txBody>
+          <a:bodyPr>
+            <a:normAutofit fontScale="90000"/>
+          </a:bodyPr>
+          <a:lstStyle/>
+          <a:p>
+            <a:r>
+              <a:rPr lang="en-US" dirty="0" smtClean="0"/>
+              <a:t>Benefits </a:t>
+            </a:r>
+            <a:r>
+              <a:rPr lang="en-US" dirty="0" smtClean="0"/>
+              <a:t>of </a:t>
+            </a:r>
+            <a:r>
+              <a:rPr lang="en-US" dirty="0" smtClean="0"/>
+              <a:t>Standardizing </a:t>
+            </a:r>
+            <a:br>
+              <a:rPr lang="en-US" dirty="0" smtClean="0"/>
+            </a:br>
+            <a:r>
+              <a:rPr lang="en-US" dirty="0" smtClean="0"/>
+              <a:t>Source Code Control</a:t>
+            </a:r>
+            <a:endParaRPr lang="en-US" dirty="0"/>
+          </a:p>
+        </p:txBody>
+      </p:sp>
+      <p:sp>
+        <p:nvSpPr>
+          <p:cNvPr id="3" name="Content Placeholder 2"/>
+          <p:cNvSpPr>
+            <a:spLocks noGrp="1"/>
+          </p:cNvSpPr>
+          <p:nvPr>
+            <p:ph idx="1"/>
+          </p:nvPr>
+        </p:nvSpPr>
+        <p:spPr>
+          <a:xfrm>
+            <a:off x="457200" y="2151238"/>
+            <a:ext cx="8229600" cy="4338899"/>
+          </a:xfrm>
+        </p:spPr>
+        <p:txBody>
+          <a:bodyPr>
+            <a:normAutofit/>
+          </a:bodyPr>
+          <a:lstStyle/>
+          <a:p>
+            <a:r>
+              <a:rPr lang="en-US" dirty="0"/>
+              <a:t>S</a:t>
+            </a:r>
+            <a:r>
+              <a:rPr lang="en-US" dirty="0" smtClean="0"/>
+              <a:t>treamline deployment process across multiple </a:t>
+            </a:r>
+            <a:r>
+              <a:rPr lang="en-US" dirty="0" smtClean="0"/>
+              <a:t>instances</a:t>
+            </a:r>
+          </a:p>
           <a:p>
             <a:pPr lvl="1"/>
             <a:r>
-              <a:rPr lang="en-US" sz="1600" dirty="0">
-                <a:hlinkClick r:id="rId7"/>
+              <a:rPr lang="en-US" dirty="0"/>
+              <a:t>A</a:t>
+            </a:r>
+            <a:r>
+              <a:rPr lang="en-US" dirty="0" smtClean="0"/>
+              <a:t>utomate </a:t>
+            </a:r>
+            <a:r>
+              <a:rPr lang="en-US" dirty="0" smtClean="0"/>
+              <a:t>deployment across </a:t>
+            </a:r>
+            <a:r>
+              <a:rPr lang="en-US" dirty="0" smtClean="0"/>
+              <a:t>non-production </a:t>
+            </a:r>
+            <a:r>
+              <a:rPr lang="en-US" dirty="0" smtClean="0"/>
+              <a:t>instances to support “dot release” QA </a:t>
+            </a:r>
+            <a:r>
+              <a:rPr lang="en-US" dirty="0" smtClean="0"/>
+              <a:t>environments</a:t>
+            </a:r>
+            <a:endParaRPr lang="en-US" dirty="0"/>
+          </a:p>
+          <a:p>
+            <a:r>
+              <a:rPr lang="en-US" dirty="0" smtClean="0"/>
+              <a:t>Single source of the truth</a:t>
+            </a:r>
+          </a:p>
+          <a:p>
+            <a:r>
+              <a:rPr lang="en-US" dirty="0"/>
+              <a:t>Extend source code control across MIS platforms</a:t>
+            </a:r>
+          </a:p>
+          <a:p>
+            <a:r>
+              <a:rPr lang="en-US" dirty="0"/>
+              <a:t>Allows for easier restores if necessary</a:t>
+            </a:r>
+          </a:p>
+          <a:p>
+            <a:r>
+              <a:rPr lang="en-US" dirty="0"/>
+              <a:t>Simplifies multi-user development</a:t>
+            </a:r>
+          </a:p>
+          <a:p>
+            <a:r>
+              <a:rPr lang="en-US" dirty="0"/>
+              <a:t>Easily maintain different versions </a:t>
+            </a:r>
+            <a:r>
+              <a:rPr lang="en-US" dirty="0" smtClean="0"/>
+              <a:t>of </a:t>
+            </a:r>
+            <a:r>
+              <a:rPr lang="en-US" dirty="0"/>
+              <a:t>an application</a:t>
+            </a:r>
+          </a:p>
+          <a:p>
+            <a:endParaRPr lang="en-US" dirty="0" smtClean="0"/>
+          </a:p>
+          <a:p>
+            <a:endParaRPr lang="en-US" dirty="0" smtClean="0"/>
+          </a:p>
+        </p:txBody>
+      </p:sp>
+      <p:sp>
+        <p:nvSpPr>
+          <p:cNvPr id="4" name="Slide Number Placeholder 3"/>
+          <p:cNvSpPr>
+            <a:spLocks noGrp="1"/>
+          </p:cNvSpPr>
+          <p:nvPr>
+            <p:ph type="sldNum" sz="quarter" idx="12"/>
+          </p:nvPr>
+        </p:nvSpPr>
+        <p:spPr/>
+        <p:txBody>
+          <a:bodyPr/>
+          <a:lstStyle/>
+          <a:p>
+            <a:pPr>
+              <a:defRPr/>
+            </a:pPr>
+            <a:fld id="{FFC8DA91-1027-405E-982D-FEC1575099C3}" type="slidenum">
+              <a:rPr lang="en-US" smtClean="0"/>
+              <a:pPr>
+                <a:defRPr/>
+              </a:pPr>
+              <a:t>3</a:t>
+            </a:fld>
+            <a:endParaRPr lang="en-US" dirty="0"/>
+          </a:p>
+        </p:txBody>
+      </p:sp>
+    </p:spTree>
+    <p:extLst>
+      <p:ext uri="{BB962C8B-B14F-4D97-AF65-F5344CB8AC3E}">
+        <p14:creationId xmlns:p14="http://schemas.microsoft.com/office/powerpoint/2010/main" val="425316312"/>
+      </p:ext>
+    </p:extLst>
+  </p:cSld>
+  <p:clrMapOvr>
+    <a:masterClrMapping/>
+  </p:clrMapOvr>
+</p:sld>
+</file>
+
+<file path=ppt/slides/slide4.xml><?xml version="1.0" encoding="utf-8"?>
+<p:sld xmlns:a="http://schemas.openxmlformats.org/drawingml/2006/main" xmlns:r="http://schemas.openxmlformats.org/officeDocument/2006/relationships" xmlns:p="http://schemas.openxmlformats.org/presentationml/2006/main">
+  <p:cSld>
+    <p:spTree>
+      <p:nvGrpSpPr>
+        <p:cNvPr id="1" name=""/>
+        <p:cNvGrpSpPr/>
+        <p:nvPr/>
+      </p:nvGrpSpPr>
+      <p:grpSpPr>
+        <a:xfrm>
+          <a:off x="0" y="0"/>
+          <a:ext cx="0" cy="0"/>
+          <a:chOff x="0" y="0"/>
+          <a:chExt cx="0" cy="0"/>
+        </a:xfrm>
+      </p:grpSpPr>
+      <p:sp>
+        <p:nvSpPr>
+          <p:cNvPr id="2" name="Title 1"/>
+          <p:cNvSpPr>
+            <a:spLocks noGrp="1"/>
+          </p:cNvSpPr>
+          <p:nvPr>
+            <p:ph type="title"/>
+          </p:nvPr>
+        </p:nvSpPr>
+        <p:spPr/>
+        <p:txBody>
+          <a:bodyPr/>
+          <a:lstStyle/>
+          <a:p>
+            <a:r>
+              <a:rPr lang="en-US" dirty="0" smtClean="0"/>
+              <a:t>Why not SharePoint?</a:t>
+            </a:r>
+            <a:endParaRPr lang="en-US" dirty="0"/>
+          </a:p>
+        </p:txBody>
+      </p:sp>
+      <p:sp>
+        <p:nvSpPr>
+          <p:cNvPr id="3" name="Content Placeholder 2"/>
+          <p:cNvSpPr>
+            <a:spLocks noGrp="1"/>
+          </p:cNvSpPr>
+          <p:nvPr>
+            <p:ph idx="1"/>
+          </p:nvPr>
+        </p:nvSpPr>
+        <p:spPr/>
+        <p:txBody>
+          <a:bodyPr/>
+          <a:lstStyle/>
+          <a:p>
+            <a:r>
+              <a:rPr lang="en-US" dirty="0" smtClean="0"/>
+              <a:t>Not an intended use case</a:t>
+            </a:r>
+          </a:p>
+          <a:p>
+            <a:r>
+              <a:rPr lang="en-US" dirty="0" smtClean="0"/>
+              <a:t>Can’t link changes of multiple files together</a:t>
+            </a:r>
+          </a:p>
+          <a:p>
+            <a:r>
+              <a:rPr lang="en-US" dirty="0" smtClean="0"/>
+              <a:t>Limited diff support</a:t>
+            </a:r>
+          </a:p>
+          <a:p>
+            <a:r>
+              <a:rPr lang="en-US" dirty="0" smtClean="0"/>
+              <a:t>Not developer-friendly</a:t>
+            </a:r>
+          </a:p>
+          <a:p>
+            <a:pPr lvl="1"/>
+            <a:r>
+              <a:rPr lang="en-US" dirty="0" smtClean="0"/>
+              <a:t>No IDE integration, CLI support</a:t>
+            </a:r>
+            <a:endParaRPr lang="en-US" dirty="0"/>
+          </a:p>
+        </p:txBody>
+      </p:sp>
+      <p:sp>
+        <p:nvSpPr>
+          <p:cNvPr id="4" name="Slide Number Placeholder 3"/>
+          <p:cNvSpPr>
+            <a:spLocks noGrp="1"/>
+          </p:cNvSpPr>
+          <p:nvPr>
+            <p:ph type="sldNum" sz="quarter" idx="12"/>
+          </p:nvPr>
+        </p:nvSpPr>
+        <p:spPr>
+          <a:xfrm>
+            <a:off x="4305300" y="6356350"/>
+            <a:ext cx="533400" cy="365125"/>
+          </a:xfrm>
+        </p:spPr>
+        <p:txBody>
+          <a:bodyPr/>
+          <a:lstStyle/>
+          <a:p>
+            <a:pPr>
+              <a:defRPr/>
+            </a:pPr>
+            <a:fld id="{FFC8DA91-1027-405E-982D-FEC1575099C3}" type="slidenum">
+              <a:rPr lang="en-US" smtClean="0"/>
+              <a:pPr>
+                <a:defRPr/>
+              </a:pPr>
+              <a:t>4</a:t>
+            </a:fld>
+            <a:endParaRPr lang="en-US" dirty="0"/>
+          </a:p>
+        </p:txBody>
+      </p:sp>
+    </p:spTree>
+    <p:extLst>
+      <p:ext uri="{BB962C8B-B14F-4D97-AF65-F5344CB8AC3E}">
+        <p14:creationId xmlns:p14="http://schemas.microsoft.com/office/powerpoint/2010/main" val="2585363705"/>
+      </p:ext>
+    </p:extLst>
+  </p:cSld>
+  <p:clrMapOvr>
+    <a:masterClrMapping/>
+  </p:clrMapOvr>
+</p:sld>
+</file>
+
+<file path=ppt/slides/slide5.xml><?xml version="1.0" encoding="utf-8"?>
+<p:sld xmlns:a="http://schemas.openxmlformats.org/drawingml/2006/main" xmlns:r="http://schemas.openxmlformats.org/officeDocument/2006/relationships" xmlns:p="http://schemas.openxmlformats.org/presentationml/2006/main">
+  <p:cSld>
+    <p:spTree>
+      <p:nvGrpSpPr>
+        <p:cNvPr id="1" name=""/>
+        <p:cNvGrpSpPr/>
+        <p:nvPr/>
+      </p:nvGrpSpPr>
+      <p:grpSpPr>
+        <a:xfrm>
+          <a:off x="0" y="0"/>
+          <a:ext cx="0" cy="0"/>
+          <a:chOff x="0" y="0"/>
+          <a:chExt cx="0" cy="0"/>
+        </a:xfrm>
+      </p:grpSpPr>
+      <p:sp>
+        <p:nvSpPr>
+          <p:cNvPr id="2" name="Title 1"/>
+          <p:cNvSpPr>
+            <a:spLocks noGrp="1"/>
+          </p:cNvSpPr>
+          <p:nvPr>
+            <p:ph type="title"/>
+          </p:nvPr>
+        </p:nvSpPr>
+        <p:spPr/>
+        <p:txBody>
+          <a:bodyPr/>
+          <a:lstStyle/>
+          <a:p>
+            <a:r>
+              <a:rPr lang="en-US" dirty="0" smtClean="0"/>
+              <a:t>Do you get </a:t>
+            </a:r>
+            <a:r>
+              <a:rPr lang="en-US" dirty="0" err="1" smtClean="0"/>
+              <a:t>Git</a:t>
+            </a:r>
+            <a:r>
+              <a:rPr lang="en-US" dirty="0" smtClean="0"/>
+              <a:t>?</a:t>
+            </a:r>
+            <a:endParaRPr lang="en-US" dirty="0"/>
+          </a:p>
+        </p:txBody>
+      </p:sp>
+      <p:sp>
+        <p:nvSpPr>
+          <p:cNvPr id="3" name="Content Placeholder 2"/>
+          <p:cNvSpPr>
+            <a:spLocks noGrp="1"/>
+          </p:cNvSpPr>
+          <p:nvPr>
+            <p:ph idx="1"/>
+          </p:nvPr>
+        </p:nvSpPr>
+        <p:spPr/>
+        <p:txBody>
+          <a:bodyPr>
+            <a:normAutofit fontScale="85000" lnSpcReduction="20000"/>
+          </a:bodyPr>
+          <a:lstStyle/>
+          <a:p>
+            <a:pPr marL="0" indent="0">
+              <a:buNone/>
+            </a:pPr>
+            <a:r>
+              <a:rPr lang="en-US" dirty="0" smtClean="0"/>
+              <a:t>“In </a:t>
+            </a:r>
+            <a:r>
+              <a:rPr lang="en-US" dirty="0"/>
+              <a:t>software development, </a:t>
+            </a:r>
+            <a:r>
+              <a:rPr lang="en-US" dirty="0" err="1"/>
+              <a:t>Git</a:t>
+            </a:r>
+            <a:r>
+              <a:rPr lang="en-US" dirty="0"/>
+              <a:t> /</a:t>
+            </a:r>
+            <a:r>
+              <a:rPr lang="en-US" dirty="0" err="1"/>
+              <a:t>ɡɪt</a:t>
+            </a:r>
+            <a:r>
+              <a:rPr lang="en-US" dirty="0"/>
+              <a:t>/ is a distributed revision control and source code management (SCM) system with an emphasis on speed.[4] </a:t>
+            </a:r>
+            <a:r>
+              <a:rPr lang="en-US" dirty="0" err="1"/>
+              <a:t>Git</a:t>
+            </a:r>
+            <a:r>
+              <a:rPr lang="en-US" dirty="0"/>
+              <a:t> was initially designed and developed by Linus Torvalds for Linux kernel development in 2005</a:t>
+            </a:r>
+            <a:r>
+              <a:rPr lang="en-US" dirty="0" smtClean="0"/>
+              <a:t>.</a:t>
+            </a:r>
+          </a:p>
+          <a:p>
+            <a:pPr marL="0" indent="0">
+              <a:buNone/>
+            </a:pPr>
+            <a:r>
+              <a:rPr lang="en-US" dirty="0"/>
+              <a:t>Every </a:t>
+            </a:r>
+            <a:r>
+              <a:rPr lang="en-US" dirty="0" err="1"/>
+              <a:t>Git</a:t>
+            </a:r>
+            <a:r>
+              <a:rPr lang="en-US" dirty="0"/>
+              <a:t> working directory is a full-fledged repository with complete history and full version tracking capabilities, not dependent on network access or a central server</a:t>
+            </a:r>
+            <a:r>
+              <a:rPr lang="en-US" dirty="0" smtClean="0"/>
+              <a:t>.</a:t>
+            </a:r>
+          </a:p>
+          <a:p>
+            <a:pPr marL="0" indent="0">
+              <a:buNone/>
+            </a:pPr>
+            <a:r>
+              <a:rPr lang="en-US" dirty="0" err="1"/>
+              <a:t>Git</a:t>
+            </a:r>
+            <a:r>
+              <a:rPr lang="en-US" dirty="0"/>
+              <a:t> is free software distributed under the terms of the GNU General Public License version 2</a:t>
+            </a:r>
+            <a:r>
+              <a:rPr lang="en-US" dirty="0" smtClean="0"/>
+              <a:t>.”</a:t>
+            </a:r>
+          </a:p>
+          <a:p>
+            <a:pPr marL="0" indent="0">
+              <a:buNone/>
+            </a:pPr>
+            <a:r>
+              <a:rPr lang="en-US" dirty="0"/>
+              <a:t>- Wikipedia (</a:t>
+            </a:r>
+            <a:r>
+              <a:rPr lang="en-US" dirty="0">
+                <a:hlinkClick r:id="rId2"/>
               </a:rPr>
-              <a:t>http://git-scm.com/about/branching-and-merging</a:t>
-            </a:r>
-            <a:endParaRPr lang="en-US" sz="1600" dirty="0"/>
-          </a:p>
-          <a:p>
-            <a:pPr lvl="1"/>
-            <a:r>
-              <a:rPr lang="en-US" sz="1600" dirty="0">
-                <a:hlinkClick r:id="rId8"/>
-              </a:rPr>
-              <a:t>https://www.atlassian.com/git/tutorial/git-basics</a:t>
-            </a:r>
-            <a:endParaRPr lang="en-US" sz="1600" dirty="0"/>
-          </a:p>
-          <a:p>
-            <a:pPr lvl="1"/>
-            <a:endParaRPr lang="en-US" sz="1600" dirty="0" smtClean="0"/>
-          </a:p>
-          <a:p>
-            <a:pPr lvl="1"/>
-            <a:endParaRPr lang="en-US" sz="1600" dirty="0" smtClean="0"/>
-          </a:p>
-          <a:p>
-            <a:endParaRPr lang="en-US" sz="1600" dirty="0" smtClean="0"/>
-          </a:p>
-          <a:p>
-            <a:endParaRPr lang="en-US" sz="1600" dirty="0"/>
+              <a:t>http://en.wikipedia.org/wiki/Git_(software</a:t>
+            </a:r>
+            <a:r>
+              <a:rPr lang="en-US" dirty="0" smtClean="0"/>
+              <a:t>)) </a:t>
+            </a:r>
+            <a:endParaRPr lang="en-US" dirty="0"/>
           </a:p>
         </p:txBody>
       </p:sp>
@@ -6408,6 +8394,154 @@
           </p:nvPr>
         </p:nvSpPr>
         <p:spPr/>
+        <p:txBody>
+          <a:bodyPr/>
+          <a:lstStyle/>
+          <a:p>
+            <a:pPr>
+              <a:defRPr/>
+            </a:pPr>
+            <a:fld id="{FFC8DA91-1027-405E-982D-FEC1575099C3}" type="slidenum">
+              <a:rPr lang="en-US" smtClean="0"/>
+              <a:pPr>
+                <a:defRPr/>
+              </a:pPr>
+              <a:t>5</a:t>
+            </a:fld>
+            <a:endParaRPr lang="en-US"/>
+          </a:p>
+        </p:txBody>
+      </p:sp>
+    </p:spTree>
+    <p:extLst>
+      <p:ext uri="{BB962C8B-B14F-4D97-AF65-F5344CB8AC3E}">
+        <p14:creationId xmlns:p14="http://schemas.microsoft.com/office/powerpoint/2010/main" val="3465155390"/>
+      </p:ext>
+    </p:extLst>
+  </p:cSld>
+  <p:clrMapOvr>
+    <a:masterClrMapping/>
+  </p:clrMapOvr>
+</p:sld>
+</file>
+
+<file path=ppt/slides/slide6.xml><?xml version="1.0" encoding="utf-8"?>
+<p:sld xmlns:a="http://schemas.openxmlformats.org/drawingml/2006/main" xmlns:r="http://schemas.openxmlformats.org/officeDocument/2006/relationships" xmlns:p="http://schemas.openxmlformats.org/presentationml/2006/main">
+  <p:cSld>
+    <p:spTree>
+      <p:nvGrpSpPr>
+        <p:cNvPr id="1" name=""/>
+        <p:cNvGrpSpPr/>
+        <p:nvPr/>
+      </p:nvGrpSpPr>
+      <p:grpSpPr>
+        <a:xfrm>
+          <a:off x="0" y="0"/>
+          <a:ext cx="0" cy="0"/>
+          <a:chOff x="0" y="0"/>
+          <a:chExt cx="0" cy="0"/>
+        </a:xfrm>
+      </p:grpSpPr>
+      <p:sp>
+        <p:nvSpPr>
+          <p:cNvPr id="2" name="Title 1"/>
+          <p:cNvSpPr>
+            <a:spLocks noGrp="1"/>
+          </p:cNvSpPr>
+          <p:nvPr>
+            <p:ph type="title"/>
+          </p:nvPr>
+        </p:nvSpPr>
+        <p:spPr/>
+        <p:txBody>
+          <a:bodyPr/>
+          <a:lstStyle/>
+          <a:p>
+            <a:r>
+              <a:rPr lang="en-US" dirty="0" smtClean="0"/>
+              <a:t>Why </a:t>
+            </a:r>
+            <a:r>
+              <a:rPr lang="en-US" dirty="0" err="1" smtClean="0"/>
+              <a:t>Git</a:t>
+            </a:r>
+            <a:r>
+              <a:rPr lang="en-US" dirty="0" smtClean="0"/>
+              <a:t>?</a:t>
+            </a:r>
+            <a:br>
+              <a:rPr lang="en-US" dirty="0" smtClean="0"/>
+            </a:br>
+            <a:r>
+              <a:rPr lang="en-US" dirty="0" smtClean="0"/>
+              <a:t>Multiple Interaction Modes</a:t>
+            </a:r>
+            <a:endParaRPr lang="en-US" dirty="0"/>
+          </a:p>
+        </p:txBody>
+      </p:sp>
+      <p:sp>
+        <p:nvSpPr>
+          <p:cNvPr id="3" name="Content Placeholder 2"/>
+          <p:cNvSpPr>
+            <a:spLocks noGrp="1"/>
+          </p:cNvSpPr>
+          <p:nvPr>
+            <p:ph idx="1"/>
+          </p:nvPr>
+        </p:nvSpPr>
+        <p:spPr/>
+        <p:txBody>
+          <a:bodyPr/>
+          <a:lstStyle/>
+          <a:p>
+            <a:r>
+              <a:rPr lang="en-US" dirty="0" smtClean="0"/>
+              <a:t>Command line</a:t>
+            </a:r>
+          </a:p>
+        </p:txBody>
+      </p:sp>
+      <p:pic>
+        <p:nvPicPr>
+          <p:cNvPr id="4" name="Picture 3"/>
+          <p:cNvPicPr>
+            <a:picLocks noChangeAspect="1"/>
+          </p:cNvPicPr>
+          <p:nvPr/>
+        </p:nvPicPr>
+        <p:blipFill>
+          <a:blip r:embed="rId2"/>
+          <a:stretch>
+            <a:fillRect/>
+          </a:stretch>
+        </p:blipFill>
+        <p:spPr>
+          <a:xfrm>
+            <a:off x="1925583" y="3419366"/>
+            <a:ext cx="4844831" cy="1406271"/>
+          </a:xfrm>
+          <a:prstGeom prst="rect">
+            <a:avLst/>
+          </a:prstGeom>
+        </p:spPr>
+      </p:pic>
+      <p:sp>
+        <p:nvSpPr>
+          <p:cNvPr id="5" name="Slide Number Placeholder 3"/>
+          <p:cNvSpPr>
+            <a:spLocks noGrp="1"/>
+          </p:cNvSpPr>
+          <p:nvPr>
+            <p:ph type="sldNum" sz="quarter" idx="12"/>
+          </p:nvPr>
+        </p:nvSpPr>
+        <p:spPr>
+          <a:xfrm>
+            <a:off x="4305300" y="6356350"/>
+            <a:ext cx="533400" cy="365125"/>
+          </a:xfrm>
+        </p:spPr>
         <p:txBody>
           <a:bodyPr/>
           <a:lstStyle/>
@@ -6422,14 +8556,14 @@
               </a:pPr>
               <a:t>6</a:t>
             </a:fld>
-            <a:endParaRPr lang="en-US"/>
+            <a:endParaRPr lang="en-US" dirty="0"/>
           </a:p>
         </p:txBody>
       </p:sp>
     </p:spTree>
     <p:extLst>
       <p:ext uri="{BB962C8B-B14F-4D97-AF65-F5344CB8AC3E}">
-        <p14:creationId xmlns:p14="http://schemas.microsoft.com/office/powerpoint/2010/main" val="1529115142"/>
+        <p14:creationId xmlns:p14="http://schemas.microsoft.com/office/powerpoint/2010/main" val="3132651251"/>
       </p:ext>
     </p:extLst>
   </p:cSld>
@@ -6468,48 +8602,87 @@
         </p:nvSpPr>
         <p:spPr/>
         <p:txBody>
-          <a:bodyPr>
-            <a:normAutofit fontScale="90000"/>
-          </a:bodyPr>
-          <a:lstStyle/>
-          <a:p>
-            <a:r>
-              <a:rPr lang="en-US" dirty="0" smtClean="0"/>
-              <a:t>Let’s take a look…</a:t>
+          <a:bodyPr/>
+          <a:lstStyle/>
+          <a:p>
+            <a:r>
+              <a:rPr lang="en-US" dirty="0" smtClean="0"/>
+              <a:t>Why </a:t>
+            </a:r>
+            <a:r>
+              <a:rPr lang="en-US" dirty="0" err="1" smtClean="0"/>
+              <a:t>Git</a:t>
+            </a:r>
+            <a:r>
+              <a:rPr lang="en-US" dirty="0" smtClean="0"/>
+              <a:t>?</a:t>
             </a:r>
             <a:br>
               <a:rPr lang="en-US" dirty="0" smtClean="0"/>
             </a:br>
             <a:r>
               <a:rPr lang="en-US" dirty="0" smtClean="0"/>
-              <a:t>demo</a:t>
+              <a:t>Multiple Interaction Modes</a:t>
             </a:r>
             <a:endParaRPr lang="en-US" dirty="0"/>
+          </a:p>
+        </p:txBody>
+      </p:sp>
+      <p:sp>
+        <p:nvSpPr>
+          <p:cNvPr id="3" name="Content Placeholder 2"/>
+          <p:cNvSpPr>
+            <a:spLocks noGrp="1"/>
+          </p:cNvSpPr>
+          <p:nvPr>
+            <p:ph idx="1"/>
+          </p:nvPr>
+        </p:nvSpPr>
+        <p:spPr/>
+        <p:txBody>
+          <a:bodyPr/>
+          <a:lstStyle/>
+          <a:p>
+            <a:r>
+              <a:rPr lang="en-US" dirty="0" smtClean="0"/>
+              <a:t>Command line</a:t>
+            </a:r>
+          </a:p>
+          <a:p>
+            <a:r>
+              <a:rPr lang="en-US" dirty="0" smtClean="0"/>
+              <a:t>GUI clients</a:t>
+            </a:r>
           </a:p>
         </p:txBody>
       </p:sp>
       <p:pic>
         <p:nvPicPr>
-          <p:cNvPr id="5" name="Content Placeholder 4"/>
+          <p:cNvPr id="5" name="Picture 4"/>
           <p:cNvPicPr>
-            <a:picLocks noGrp="1" noChangeAspect="1"/>
+            <a:picLocks noChangeAspect="1"/>
           </p:cNvPicPr>
-          <p:nvPr>
-            <p:ph idx="1"/>
-          </p:nvPr>
+          <p:nvPr/>
         </p:nvPicPr>
         <p:blipFill>
           <a:blip r:embed="rId2"/>
-          <a:srcRect t="14677" b="14677"/>
           <a:stretch>
             <a:fillRect/>
           </a:stretch>
         </p:blipFill>
-        <p:spPr/>
+        <p:spPr>
+          <a:xfrm>
+            <a:off x="2855310" y="3170616"/>
+            <a:ext cx="6157310" cy="3301491"/>
+          </a:xfrm>
+          <a:prstGeom prst="rect">
+            <a:avLst/>
+          </a:prstGeom>
+        </p:spPr>
       </p:pic>
       <p:sp>
         <p:nvSpPr>
-          <p:cNvPr id="4" name="Slide Number Placeholder 3"/>
+          <p:cNvPr id="6" name="Slide Number Placeholder 3"/>
           <p:cNvSpPr>
             <a:spLocks noGrp="1"/>
           </p:cNvSpPr>
@@ -6517,7 +8690,12 @@
             <p:ph type="sldNum" sz="quarter" idx="12"/>
           </p:nvPr>
         </p:nvSpPr>
-        <p:spPr/>
+        <p:spPr>
+          <a:xfrm>
+            <a:off x="4305300" y="6356350"/>
+            <a:ext cx="533400" cy="365125"/>
+          </a:xfrm>
+        </p:spPr>
         <p:txBody>
           <a:bodyPr/>
           <a:lstStyle/>
@@ -6532,14 +8710,14 @@
               </a:pPr>
               <a:t>7</a:t>
             </a:fld>
-            <a:endParaRPr lang="en-US"/>
+            <a:endParaRPr lang="en-US" dirty="0"/>
           </a:p>
         </p:txBody>
       </p:sp>
     </p:spTree>
     <p:extLst>
       <p:ext uri="{BB962C8B-B14F-4D97-AF65-F5344CB8AC3E}">
-        <p14:creationId xmlns:p14="http://schemas.microsoft.com/office/powerpoint/2010/main" val="1637528627"/>
+        <p14:creationId xmlns:p14="http://schemas.microsoft.com/office/powerpoint/2010/main" val="4294718834"/>
       </p:ext>
     </p:extLst>
   </p:cSld>
@@ -6583,7 +8761,22 @@
           <a:p>
             <a:r>
               <a:rPr lang="en-US" dirty="0" smtClean="0"/>
-              <a:t>Word on the street…</a:t>
+              <a:t>Why </a:t>
+            </a:r>
+            <a:r>
+              <a:rPr lang="en-US" dirty="0" err="1" smtClean="0"/>
+              <a:t>Git</a:t>
+            </a:r>
+            <a:r>
+              <a:rPr lang="en-US" dirty="0" smtClean="0"/>
+              <a:t>?</a:t>
+            </a:r>
+            <a:br>
+              <a:rPr lang="en-US" dirty="0" smtClean="0"/>
+            </a:br>
+            <a:r>
+              <a:rPr lang="en-US" dirty="0" smtClean="0"/>
+              <a:t>Multiple Interaction Modes</a:t>
             </a:r>
             <a:endParaRPr lang="en-US" dirty="0"/>
           </a:p>
@@ -6591,30 +8784,36 @@
       </p:sp>
       <p:sp>
         <p:nvSpPr>
-          <p:cNvPr id="4" name="Slide Number Placeholder 3"/>
-          <p:cNvSpPr>
-            <a:spLocks noGrp="1"/>
-          </p:cNvSpPr>
-          <p:nvPr>
-            <p:ph type="sldNum" sz="quarter" idx="12"/>
-          </p:nvPr>
-        </p:nvSpPr>
-        <p:spPr/>
-        <p:txBody>
-          <a:bodyPr/>
-          <a:lstStyle/>
-          <a:p>
-            <a:pPr>
-              <a:defRPr/>
-            </a:pPr>
-            <a:fld id="{FFC8DA91-1027-405E-982D-FEC1575099C3}" type="slidenum">
-              <a:rPr lang="en-US" smtClean="0"/>
-              <a:pPr>
-                <a:defRPr/>
-              </a:pPr>
-              <a:t>8</a:t>
-            </a:fld>
-            <a:endParaRPr lang="en-US"/>
+          <p:cNvPr id="3" name="Content Placeholder 2"/>
+          <p:cNvSpPr>
+            <a:spLocks noGrp="1"/>
+          </p:cNvSpPr>
+          <p:nvPr>
+            <p:ph idx="1"/>
+          </p:nvPr>
+        </p:nvSpPr>
+        <p:spPr/>
+        <p:txBody>
+          <a:bodyPr/>
+          <a:lstStyle/>
+          <a:p>
+            <a:r>
+              <a:rPr lang="en-US" dirty="0" smtClean="0"/>
+              <a:t>Command line</a:t>
+            </a:r>
+          </a:p>
+          <a:p>
+            <a:r>
+              <a:rPr lang="en-US" dirty="0" smtClean="0"/>
+              <a:t>GUI clients</a:t>
+            </a:r>
+          </a:p>
+          <a:p>
+            <a:r>
+              <a:rPr lang="en-US" dirty="0" smtClean="0"/>
+              <a:t>Web interface</a:t>
+            </a:r>
+            <a:endParaRPr lang="en-US" dirty="0"/>
           </a:p>
         </p:txBody>
       </p:sp>
@@ -6634,8 +8833,8 @@
         </p:blipFill>
         <p:spPr>
           <a:xfrm>
-            <a:off x="4343400" y="2895600"/>
-            <a:ext cx="2070100" cy="2112781"/>
+            <a:off x="3135587" y="2621918"/>
+            <a:ext cx="5789447" cy="3823649"/>
           </a:xfrm>
           <a:prstGeom prst="rect">
             <a:avLst/>
@@ -6644,122 +8843,209 @@
       </p:pic>
       <p:sp>
         <p:nvSpPr>
-          <p:cNvPr id="6" name="Oval Callout 5"/>
-          <p:cNvSpPr/>
-          <p:nvPr/>
-        </p:nvSpPr>
-        <p:spPr bwMode="auto">
-          <a:xfrm>
-            <a:off x="1078655" y="2659119"/>
-            <a:ext cx="2987924" cy="2133600"/>
-          </a:xfrm>
-          <a:prstGeom prst="wedgeEllipseCallout">
-            <a:avLst>
-              <a:gd name="adj1" fmla="val 59668"/>
-              <a:gd name="adj2" fmla="val 21358"/>
-            </a:avLst>
-          </a:prstGeom>
-          <a:solidFill>
-            <a:schemeClr val="bg1">
-              <a:lumMod val="75000"/>
-            </a:schemeClr>
-          </a:solidFill>
-          <a:ln w="12700" cap="flat" cmpd="sng" algn="ctr">
-            <a:solidFill>
-              <a:schemeClr val="tx1"/>
-            </a:solidFill>
-            <a:prstDash val="solid"/>
-            <a:round/>
-            <a:headEnd type="none" w="med" len="med"/>
-            <a:tailEnd type="none" w="med" len="med"/>
-          </a:ln>
-          <a:effectLst/>
-        </p:spPr>
-        <p:txBody>
-          <a:bodyPr anchor="ctr"/>
-          <a:lstStyle/>
-          <a:p>
-            <a:pPr marL="0" indent="0" algn="ctr">
-              <a:buNone/>
-            </a:pPr>
-            <a:r>
-              <a:rPr lang="en-US" sz="3200" dirty="0">
-                <a:solidFill>
-                  <a:srgbClr val="0000FF"/>
-                </a:solidFill>
-                <a:latin typeface="Cooper Black"/>
-                <a:cs typeface="Cooper Black"/>
-              </a:rPr>
-              <a:t>“It</a:t>
-            </a:r>
-            <a:r>
-              <a:rPr lang="fr-FR" sz="3200" dirty="0">
-                <a:solidFill>
-                  <a:srgbClr val="0000FF"/>
-                </a:solidFill>
-                <a:latin typeface="Cooper Black"/>
-                <a:cs typeface="Cooper Black"/>
-              </a:rPr>
-              <a:t>’</a:t>
-            </a:r>
-            <a:r>
-              <a:rPr lang="en-US" sz="3200" dirty="0">
-                <a:solidFill>
-                  <a:srgbClr val="0000FF"/>
-                </a:solidFill>
-                <a:latin typeface="Cooper Black"/>
-                <a:cs typeface="Cooper Black"/>
-              </a:rPr>
-              <a:t>s actually good!”</a:t>
-            </a:r>
-            <a:endParaRPr lang="en-US" sz="3200" dirty="0">
-              <a:solidFill>
-                <a:srgbClr val="0000FF"/>
-              </a:solidFill>
-              <a:latin typeface="Cooper Black"/>
-              <a:cs typeface="Cooper Black"/>
-            </a:endParaRPr>
-          </a:p>
-        </p:txBody>
-      </p:sp>
-      <p:sp>
-        <p:nvSpPr>
-          <p:cNvPr id="8" name="TextBox 7"/>
-          <p:cNvSpPr txBox="1"/>
-          <p:nvPr/>
+          <p:cNvPr id="6" name="Slide Number Placeholder 3"/>
+          <p:cNvSpPr>
+            <a:spLocks noGrp="1"/>
+          </p:cNvSpPr>
+          <p:nvPr>
+            <p:ph type="sldNum" sz="quarter" idx="12"/>
+          </p:nvPr>
         </p:nvSpPr>
         <p:spPr>
           <a:xfrm>
-            <a:off x="2093097" y="5029200"/>
-            <a:ext cx="5222103" cy="400110"/>
+            <a:off x="4305300" y="6356350"/>
+            <a:ext cx="533400" cy="365125"/>
+          </a:xfrm>
+        </p:spPr>
+        <p:txBody>
+          <a:bodyPr/>
+          <a:lstStyle/>
+          <a:p>
+            <a:pPr>
+              <a:defRPr/>
+            </a:pPr>
+            <a:fld id="{FFC8DA91-1027-405E-982D-FEC1575099C3}" type="slidenum">
+              <a:rPr lang="en-US" smtClean="0"/>
+              <a:pPr>
+                <a:defRPr/>
+              </a:pPr>
+              <a:t>8</a:t>
+            </a:fld>
+            <a:endParaRPr lang="en-US" dirty="0"/>
+          </a:p>
+        </p:txBody>
+      </p:sp>
+    </p:spTree>
+    <p:extLst>
+      <p:ext uri="{BB962C8B-B14F-4D97-AF65-F5344CB8AC3E}">
+        <p14:creationId xmlns:p14="http://schemas.microsoft.com/office/powerpoint/2010/main" val="4294718834"/>
+      </p:ext>
+    </p:extLst>
+  </p:cSld>
+  <p:clrMapOvr>
+    <a:masterClrMapping/>
+  </p:clrMapOvr>
+</p:sld>
+</file>
+
+<file path=ppt/slides/slide9.xml><?xml version="1.0" encoding="utf-8"?>
+<p:sld xmlns:a="http://schemas.openxmlformats.org/drawingml/2006/main" xmlns:r="http://schemas.openxmlformats.org/officeDocument/2006/relationships" xmlns:p="http://schemas.openxmlformats.org/presentationml/2006/main">
+  <p:cSld>
+    <p:spTree>
+      <p:nvGrpSpPr>
+        <p:cNvPr id="1" name=""/>
+        <p:cNvGrpSpPr/>
+        <p:nvPr/>
+      </p:nvGrpSpPr>
+      <p:grpSpPr>
+        <a:xfrm>
+          <a:off x="0" y="0"/>
+          <a:ext cx="0" cy="0"/>
+          <a:chOff x="0" y="0"/>
+          <a:chExt cx="0" cy="0"/>
+        </a:xfrm>
+      </p:grpSpPr>
+      <p:sp>
+        <p:nvSpPr>
+          <p:cNvPr id="2" name="Title 1"/>
+          <p:cNvSpPr>
+            <a:spLocks noGrp="1"/>
+          </p:cNvSpPr>
+          <p:nvPr>
+            <p:ph type="title"/>
+          </p:nvPr>
+        </p:nvSpPr>
+        <p:spPr/>
+        <p:txBody>
+          <a:bodyPr/>
+          <a:lstStyle/>
+          <a:p>
+            <a:r>
+              <a:rPr lang="en-US" dirty="0" smtClean="0"/>
+              <a:t>Why </a:t>
+            </a:r>
+            <a:r>
+              <a:rPr lang="en-US" dirty="0" err="1" smtClean="0"/>
+              <a:t>Git</a:t>
+            </a:r>
+            <a:r>
+              <a:rPr lang="en-US" dirty="0" smtClean="0"/>
+              <a:t>?</a:t>
+            </a:r>
+            <a:br>
+              <a:rPr lang="en-US" dirty="0" smtClean="0"/>
+            </a:br>
+            <a:r>
+              <a:rPr lang="en-US" dirty="0" smtClean="0"/>
+              <a:t>Multiple Interaction Modes</a:t>
+            </a:r>
+            <a:endParaRPr lang="en-US" dirty="0"/>
+          </a:p>
+        </p:txBody>
+      </p:sp>
+      <p:sp>
+        <p:nvSpPr>
+          <p:cNvPr id="3" name="Content Placeholder 2"/>
+          <p:cNvSpPr>
+            <a:spLocks noGrp="1"/>
+          </p:cNvSpPr>
+          <p:nvPr>
+            <p:ph idx="1"/>
+          </p:nvPr>
+        </p:nvSpPr>
+        <p:spPr/>
+        <p:txBody>
+          <a:bodyPr/>
+          <a:lstStyle/>
+          <a:p>
+            <a:r>
+              <a:rPr lang="en-US" dirty="0" smtClean="0"/>
+              <a:t>Command line</a:t>
+            </a:r>
+          </a:p>
+          <a:p>
+            <a:r>
+              <a:rPr lang="en-US" dirty="0" smtClean="0"/>
+              <a:t>GUI clients</a:t>
+            </a:r>
+          </a:p>
+          <a:p>
+            <a:r>
+              <a:rPr lang="en-US" dirty="0" smtClean="0"/>
+              <a:t>Web interface</a:t>
+            </a:r>
+          </a:p>
+          <a:p>
+            <a:r>
+              <a:rPr lang="en-US" dirty="0" smtClean="0"/>
+              <a:t>JIRA integration</a:t>
+            </a:r>
+            <a:endParaRPr lang="en-US" dirty="0"/>
+          </a:p>
+        </p:txBody>
+      </p:sp>
+      <p:pic>
+        <p:nvPicPr>
+          <p:cNvPr id="4" name="Picture 3"/>
+          <p:cNvPicPr>
+            <a:picLocks noChangeAspect="1"/>
+          </p:cNvPicPr>
+          <p:nvPr/>
+        </p:nvPicPr>
+        <p:blipFill>
+          <a:blip r:embed="rId2"/>
+          <a:stretch>
+            <a:fillRect/>
+          </a:stretch>
+        </p:blipFill>
+        <p:spPr>
+          <a:xfrm>
+            <a:off x="3266967" y="2698430"/>
+            <a:ext cx="5833238" cy="2767048"/>
           </a:xfrm>
           <a:prstGeom prst="rect">
             <a:avLst/>
           </a:prstGeom>
-          <a:noFill/>
         </p:spPr>
-        <p:txBody>
-          <a:bodyPr wrap="none" rtlCol="0">
-            <a:spAutoFit/>
-          </a:bodyPr>
-          <a:lstStyle/>
-          <a:p>
-            <a:r>
-              <a:rPr lang="en-US" sz="2000" dirty="0" smtClean="0"/>
-              <a:t>- As stated on 5/21 in regards to </a:t>
-            </a:r>
-            <a:r>
-              <a:rPr lang="en-US" sz="2000" dirty="0" err="1" smtClean="0"/>
-              <a:t>SourceTree</a:t>
-            </a:r>
-            <a:endParaRPr lang="en-US" sz="2000" dirty="0"/>
+      </p:pic>
+      <p:sp>
+        <p:nvSpPr>
+          <p:cNvPr id="5" name="Slide Number Placeholder 3"/>
+          <p:cNvSpPr>
+            <a:spLocks noGrp="1"/>
+          </p:cNvSpPr>
+          <p:nvPr>
+            <p:ph type="sldNum" sz="quarter" idx="12"/>
+          </p:nvPr>
+        </p:nvSpPr>
+        <p:spPr>
+          <a:xfrm>
+            <a:off x="4305300" y="6356350"/>
+            <a:ext cx="533400" cy="365125"/>
+          </a:xfrm>
+        </p:spPr>
+        <p:txBody>
+          <a:bodyPr/>
+          <a:lstStyle/>
+          <a:p>
+            <a:pPr>
+              <a:defRPr/>
+            </a:pPr>
+            <a:fld id="{FFC8DA91-1027-405E-982D-FEC1575099C3}" type="slidenum">
+              <a:rPr lang="en-US" smtClean="0"/>
+              <a:pPr>
+                <a:defRPr/>
+              </a:pPr>
+              <a:t>9</a:t>
+            </a:fld>
+            <a:endParaRPr lang="en-US" dirty="0"/>
           </a:p>
         </p:txBody>
       </p:sp>
     </p:spTree>
     <p:extLst>
       <p:ext uri="{BB962C8B-B14F-4D97-AF65-F5344CB8AC3E}">
-        <p14:creationId xmlns:p14="http://schemas.microsoft.com/office/powerpoint/2010/main" val="2559135229"/>
+        <p14:creationId xmlns:p14="http://schemas.microsoft.com/office/powerpoint/2010/main" val="2780062238"/>
       </p:ext>
     </p:extLst>
   </p:cSld>

</xml_diff>